<commit_message>
first commit from mac
</commit_message>
<xml_diff>
--- a/_PowerPoints/review.8.5.22.pptx
+++ b/_PowerPoints/review.8.5.22.pptx
@@ -10,6 +10,10 @@
     <p:sldId id="259" r:id="rId4"/>
     <p:sldId id="260" r:id="rId5"/>
     <p:sldId id="261" r:id="rId6"/>
+    <p:sldId id="262" r:id="rId7"/>
+    <p:sldId id="264" r:id="rId8"/>
+    <p:sldId id="263" r:id="rId9"/>
+    <p:sldId id="265" r:id="rId10"/>
   </p:sldIdLst>
   <p:sldSz cx="12192000" cy="6858000"/>
   <p:notesSz cx="6858000" cy="9144000"/>
@@ -108,6 +112,11 @@
       </a:defRPr>
     </a:lvl9pPr>
   </p:defaultTextStyle>
+  <p:extLst>
+    <p:ext uri="{EFAFB233-063F-42B5-8137-9DF3F51BA10A}">
+      <p15:sldGuideLst xmlns:p15="http://schemas.microsoft.com/office/powerpoint/2012/main"/>
+    </p:ext>
+  </p:extLst>
 </p:presentation>
 </file>
 
@@ -258,7 +267,7 @@
           <a:p>
             <a:fld id="{DC9E81F0-21A5-4350-ACDE-17FB3E98D375}" type="datetimeFigureOut">
               <a:rPr lang="en-US" smtClean="0"/>
-              <a:t>8/5/2022</a:t>
+              <a:t>8/18/22</a:t>
             </a:fld>
             <a:endParaRPr lang="en-US"/>
           </a:p>
@@ -456,7 +465,7 @@
           <a:p>
             <a:fld id="{DC9E81F0-21A5-4350-ACDE-17FB3E98D375}" type="datetimeFigureOut">
               <a:rPr lang="en-US" smtClean="0"/>
-              <a:t>8/5/2022</a:t>
+              <a:t>8/18/22</a:t>
             </a:fld>
             <a:endParaRPr lang="en-US"/>
           </a:p>
@@ -664,7 +673,7 @@
           <a:p>
             <a:fld id="{DC9E81F0-21A5-4350-ACDE-17FB3E98D375}" type="datetimeFigureOut">
               <a:rPr lang="en-US" smtClean="0"/>
-              <a:t>8/5/2022</a:t>
+              <a:t>8/18/22</a:t>
             </a:fld>
             <a:endParaRPr lang="en-US"/>
           </a:p>
@@ -862,7 +871,7 @@
           <a:p>
             <a:fld id="{DC9E81F0-21A5-4350-ACDE-17FB3E98D375}" type="datetimeFigureOut">
               <a:rPr lang="en-US" smtClean="0"/>
-              <a:t>8/5/2022</a:t>
+              <a:t>8/18/22</a:t>
             </a:fld>
             <a:endParaRPr lang="en-US"/>
           </a:p>
@@ -1137,7 +1146,7 @@
           <a:p>
             <a:fld id="{DC9E81F0-21A5-4350-ACDE-17FB3E98D375}" type="datetimeFigureOut">
               <a:rPr lang="en-US" smtClean="0"/>
-              <a:t>8/5/2022</a:t>
+              <a:t>8/18/22</a:t>
             </a:fld>
             <a:endParaRPr lang="en-US"/>
           </a:p>
@@ -1402,7 +1411,7 @@
           <a:p>
             <a:fld id="{DC9E81F0-21A5-4350-ACDE-17FB3E98D375}" type="datetimeFigureOut">
               <a:rPr lang="en-US" smtClean="0"/>
-              <a:t>8/5/2022</a:t>
+              <a:t>8/18/22</a:t>
             </a:fld>
             <a:endParaRPr lang="en-US"/>
           </a:p>
@@ -1814,7 +1823,7 @@
           <a:p>
             <a:fld id="{DC9E81F0-21A5-4350-ACDE-17FB3E98D375}" type="datetimeFigureOut">
               <a:rPr lang="en-US" smtClean="0"/>
-              <a:t>8/5/2022</a:t>
+              <a:t>8/18/22</a:t>
             </a:fld>
             <a:endParaRPr lang="en-US"/>
           </a:p>
@@ -1955,7 +1964,7 @@
           <a:p>
             <a:fld id="{DC9E81F0-21A5-4350-ACDE-17FB3E98D375}" type="datetimeFigureOut">
               <a:rPr lang="en-US" smtClean="0"/>
-              <a:t>8/5/2022</a:t>
+              <a:t>8/18/22</a:t>
             </a:fld>
             <a:endParaRPr lang="en-US"/>
           </a:p>
@@ -2068,7 +2077,7 @@
           <a:p>
             <a:fld id="{DC9E81F0-21A5-4350-ACDE-17FB3E98D375}" type="datetimeFigureOut">
               <a:rPr lang="en-US" smtClean="0"/>
-              <a:t>8/5/2022</a:t>
+              <a:t>8/18/22</a:t>
             </a:fld>
             <a:endParaRPr lang="en-US"/>
           </a:p>
@@ -2379,7 +2388,7 @@
           <a:p>
             <a:fld id="{DC9E81F0-21A5-4350-ACDE-17FB3E98D375}" type="datetimeFigureOut">
               <a:rPr lang="en-US" smtClean="0"/>
-              <a:t>8/5/2022</a:t>
+              <a:t>8/18/22</a:t>
             </a:fld>
             <a:endParaRPr lang="en-US"/>
           </a:p>
@@ -2667,7 +2676,7 @@
           <a:p>
             <a:fld id="{DC9E81F0-21A5-4350-ACDE-17FB3E98D375}" type="datetimeFigureOut">
               <a:rPr lang="en-US" smtClean="0"/>
-              <a:t>8/5/2022</a:t>
+              <a:t>8/18/22</a:t>
             </a:fld>
             <a:endParaRPr lang="en-US"/>
           </a:p>
@@ -2908,7 +2917,7 @@
           <a:p>
             <a:fld id="{DC9E81F0-21A5-4350-ACDE-17FB3E98D375}" type="datetimeFigureOut">
               <a:rPr lang="en-US" smtClean="0"/>
-              <a:t>8/5/2022</a:t>
+              <a:t>8/18/22</a:t>
             </a:fld>
             <a:endParaRPr lang="en-US"/>
           </a:p>
@@ -3309,7 +3318,7 @@
 </file>
 
 <file path=ppt/slides/slide1.xml><?xml version="1.0" encoding="utf-8"?>
-<p:sld xmlns:a="http://schemas.openxmlformats.org/drawingml/2006/main" xmlns:r="http://schemas.openxmlformats.org/officeDocument/2006/relationships" xmlns:p="http://schemas.openxmlformats.org/presentationml/2006/main">
+<p:sld xmlns:a="http://schemas.openxmlformats.org/drawingml/2006/main" xmlns:r="http://schemas.openxmlformats.org/officeDocument/2006/relationships" xmlns:p="http://schemas.openxmlformats.org/presentationml/2006/main" show="0">
   <p:cSld>
     <p:spTree>
       <p:nvGrpSpPr>
@@ -3375,7 +3384,7 @@
 </file>
 
 <file path=ppt/slides/slide2.xml><?xml version="1.0" encoding="utf-8"?>
-<p:sld xmlns:a="http://schemas.openxmlformats.org/drawingml/2006/main" xmlns:r="http://schemas.openxmlformats.org/officeDocument/2006/relationships" xmlns:p="http://schemas.openxmlformats.org/presentationml/2006/main">
+<p:sld xmlns:a="http://schemas.openxmlformats.org/drawingml/2006/main" xmlns:r="http://schemas.openxmlformats.org/officeDocument/2006/relationships" xmlns:p="http://schemas.openxmlformats.org/presentationml/2006/main" show="0">
   <p:cSld>
     <p:spTree>
       <p:nvGrpSpPr>
@@ -3427,8 +3436,8 @@
           </a:prstGeom>
         </p:spPr>
       </p:pic>
-      <mc:AlternateContent xmlns:mc="http://schemas.openxmlformats.org/markup-compatibility/2006">
-        <mc:Choice xmlns:a14="http://schemas.microsoft.com/office/drawing/2010/main" Requires="a14">
+      <mc:AlternateContent xmlns:mc="http://schemas.openxmlformats.org/markup-compatibility/2006" xmlns:a14="http://schemas.microsoft.com/office/drawing/2010/main">
+        <mc:Choice Requires="a14">
           <p:sp>
             <p:nvSpPr>
               <p:cNvPr id="6" name="TextBox 5">
@@ -3457,6 +3466,7 @@
               </a:bodyPr>
               <a:lstStyle/>
               <a:p>
+                <a:pPr/>
                 <a14:m>
                   <m:oMathPara xmlns:m="http://schemas.openxmlformats.org/officeDocument/2006/math">
                     <m:oMathParaPr>
@@ -3540,7 +3550,7 @@
             </p:txBody>
           </p:sp>
         </mc:Choice>
-        <mc:Fallback>
+        <mc:Fallback xmlns="">
           <p:sp>
             <p:nvSpPr>
               <p:cNvPr id="6" name="TextBox 5">
@@ -3585,8 +3595,8 @@
           </p:sp>
         </mc:Fallback>
       </mc:AlternateContent>
-      <mc:AlternateContent xmlns:mc="http://schemas.openxmlformats.org/markup-compatibility/2006">
-        <mc:Choice xmlns:a14="http://schemas.microsoft.com/office/drawing/2010/main" Requires="a14">
+      <mc:AlternateContent xmlns:mc="http://schemas.openxmlformats.org/markup-compatibility/2006" xmlns:a14="http://schemas.microsoft.com/office/drawing/2010/main">
+        <mc:Choice Requires="a14">
           <p:sp>
             <p:nvSpPr>
               <p:cNvPr id="7" name="TextBox 6">
@@ -3615,6 +3625,7 @@
               </a:bodyPr>
               <a:lstStyle/>
               <a:p>
+                <a:pPr/>
                 <a14:m>
                   <m:oMathPara xmlns:m="http://schemas.openxmlformats.org/officeDocument/2006/math">
                     <m:oMathParaPr>
@@ -3698,7 +3709,7 @@
             </p:txBody>
           </p:sp>
         </mc:Choice>
-        <mc:Fallback>
+        <mc:Fallback xmlns="">
           <p:sp>
             <p:nvSpPr>
               <p:cNvPr id="7" name="TextBox 6">
@@ -3903,7 +3914,7 @@
 </file>
 
 <file path=ppt/slides/slide3.xml><?xml version="1.0" encoding="utf-8"?>
-<p:sld xmlns:a="http://schemas.openxmlformats.org/drawingml/2006/main" xmlns:r="http://schemas.openxmlformats.org/officeDocument/2006/relationships" xmlns:p="http://schemas.openxmlformats.org/presentationml/2006/main">
+<p:sld xmlns:a="http://schemas.openxmlformats.org/drawingml/2006/main" xmlns:r="http://schemas.openxmlformats.org/officeDocument/2006/relationships" xmlns:p="http://schemas.openxmlformats.org/presentationml/2006/main" show="0">
   <p:cSld>
     <p:spTree>
       <p:nvGrpSpPr>
@@ -3919,8 +3930,8 @@
           <a:chExt cx="0" cy="0"/>
         </a:xfrm>
       </p:grpSpPr>
-      <mc:AlternateContent xmlns:mc="http://schemas.openxmlformats.org/markup-compatibility/2006">
-        <mc:Choice xmlns:a14="http://schemas.microsoft.com/office/drawing/2010/main" Requires="a14">
+      <mc:AlternateContent xmlns:mc="http://schemas.openxmlformats.org/markup-compatibility/2006" xmlns:a14="http://schemas.microsoft.com/office/drawing/2010/main">
+        <mc:Choice Requires="a14">
           <p:sp>
             <p:nvSpPr>
               <p:cNvPr id="2" name="TextBox 1">
@@ -3949,6 +3960,7 @@
               </a:bodyPr>
               <a:lstStyle/>
               <a:p>
+                <a:pPr/>
                 <a14:m>
                   <m:oMathPara xmlns:m="http://schemas.openxmlformats.org/officeDocument/2006/math">
                     <m:oMathParaPr>
@@ -4032,7 +4044,7 @@
             </p:txBody>
           </p:sp>
         </mc:Choice>
-        <mc:Fallback>
+        <mc:Fallback xmlns="">
           <p:sp>
             <p:nvSpPr>
               <p:cNvPr id="2" name="TextBox 1">
@@ -4077,8 +4089,8 @@
           </p:sp>
         </mc:Fallback>
       </mc:AlternateContent>
-      <mc:AlternateContent xmlns:mc="http://schemas.openxmlformats.org/markup-compatibility/2006">
-        <mc:Choice xmlns:a14="http://schemas.microsoft.com/office/drawing/2010/main" Requires="a14">
+      <mc:AlternateContent xmlns:mc="http://schemas.openxmlformats.org/markup-compatibility/2006" xmlns:a14="http://schemas.microsoft.com/office/drawing/2010/main">
+        <mc:Choice Requires="a14">
           <p:sp>
             <p:nvSpPr>
               <p:cNvPr id="3" name="TextBox 2">
@@ -4107,6 +4119,7 @@
               </a:bodyPr>
               <a:lstStyle/>
               <a:p>
+                <a:pPr/>
                 <a14:m>
                   <m:oMathPara xmlns:m="http://schemas.openxmlformats.org/officeDocument/2006/math">
                     <m:oMathParaPr>
@@ -4190,7 +4203,7 @@
             </p:txBody>
           </p:sp>
         </mc:Choice>
-        <mc:Fallback>
+        <mc:Fallback xmlns="">
           <p:sp>
             <p:nvSpPr>
               <p:cNvPr id="3" name="TextBox 2">
@@ -4472,7 +4485,7 @@
 </file>
 
 <file path=ppt/slides/slide4.xml><?xml version="1.0" encoding="utf-8"?>
-<p:sld xmlns:a="http://schemas.openxmlformats.org/drawingml/2006/main" xmlns:r="http://schemas.openxmlformats.org/officeDocument/2006/relationships" xmlns:p="http://schemas.openxmlformats.org/presentationml/2006/main">
+<p:sld xmlns:a="http://schemas.openxmlformats.org/drawingml/2006/main" xmlns:r="http://schemas.openxmlformats.org/officeDocument/2006/relationships" xmlns:p="http://schemas.openxmlformats.org/presentationml/2006/main" show="0">
   <p:cSld>
     <p:spTree>
       <p:nvGrpSpPr>
@@ -4524,8 +4537,8 @@
           </a:prstGeom>
         </p:spPr>
       </p:pic>
-      <mc:AlternateContent xmlns:mc="http://schemas.openxmlformats.org/markup-compatibility/2006">
-        <mc:Choice xmlns:a14="http://schemas.microsoft.com/office/drawing/2010/main" Requires="a14">
+      <mc:AlternateContent xmlns:mc="http://schemas.openxmlformats.org/markup-compatibility/2006" xmlns:a14="http://schemas.microsoft.com/office/drawing/2010/main">
+        <mc:Choice Requires="a14">
           <p:sp>
             <p:nvSpPr>
               <p:cNvPr id="17" name="TextBox 16">
@@ -4554,6 +4567,7 @@
               </a:bodyPr>
               <a:lstStyle/>
               <a:p>
+                <a:pPr/>
                 <a14:m>
                   <m:oMathPara xmlns:m="http://schemas.openxmlformats.org/officeDocument/2006/math">
                     <m:oMathParaPr>
@@ -4637,7 +4651,7 @@
             </p:txBody>
           </p:sp>
         </mc:Choice>
-        <mc:Fallback>
+        <mc:Fallback xmlns="">
           <p:sp>
             <p:nvSpPr>
               <p:cNvPr id="17" name="TextBox 16">
@@ -4682,8 +4696,8 @@
           </p:sp>
         </mc:Fallback>
       </mc:AlternateContent>
-      <mc:AlternateContent xmlns:mc="http://schemas.openxmlformats.org/markup-compatibility/2006">
-        <mc:Choice xmlns:a14="http://schemas.microsoft.com/office/drawing/2010/main" Requires="a14">
+      <mc:AlternateContent xmlns:mc="http://schemas.openxmlformats.org/markup-compatibility/2006" xmlns:a14="http://schemas.microsoft.com/office/drawing/2010/main">
+        <mc:Choice Requires="a14">
           <p:sp>
             <p:nvSpPr>
               <p:cNvPr id="18" name="TextBox 17">
@@ -4712,6 +4726,7 @@
               </a:bodyPr>
               <a:lstStyle/>
               <a:p>
+                <a:pPr/>
                 <a14:m>
                   <m:oMathPara xmlns:m="http://schemas.openxmlformats.org/officeDocument/2006/math">
                     <m:oMathParaPr>
@@ -4795,7 +4810,7 @@
             </p:txBody>
           </p:sp>
         </mc:Choice>
-        <mc:Fallback>
+        <mc:Fallback xmlns="">
           <p:sp>
             <p:nvSpPr>
               <p:cNvPr id="18" name="TextBox 17">
@@ -5000,7 +5015,7 @@
 </file>
 
 <file path=ppt/slides/slide5.xml><?xml version="1.0" encoding="utf-8"?>
-<p:sld xmlns:a="http://schemas.openxmlformats.org/drawingml/2006/main" xmlns:r="http://schemas.openxmlformats.org/officeDocument/2006/relationships" xmlns:p="http://schemas.openxmlformats.org/presentationml/2006/main">
+<p:sld xmlns:a="http://schemas.openxmlformats.org/drawingml/2006/main" xmlns:r="http://schemas.openxmlformats.org/officeDocument/2006/relationships" xmlns:p="http://schemas.openxmlformats.org/presentationml/2006/main" show="0">
   <p:cSld>
     <p:spTree>
       <p:nvGrpSpPr>
@@ -5093,8 +5108,8 @@
           </a:p>
         </p:txBody>
       </p:sp>
-      <mc:AlternateContent xmlns:mc="http://schemas.openxmlformats.org/markup-compatibility/2006">
-        <mc:Choice xmlns:a14="http://schemas.microsoft.com/office/drawing/2010/main" Requires="a14">
+      <mc:AlternateContent xmlns:mc="http://schemas.openxmlformats.org/markup-compatibility/2006" xmlns:a14="http://schemas.microsoft.com/office/drawing/2010/main">
+        <mc:Choice Requires="a14">
           <p:sp>
             <p:nvSpPr>
               <p:cNvPr id="4" name="TextBox 3">
@@ -5123,6 +5138,7 @@
               </a:bodyPr>
               <a:lstStyle/>
               <a:p>
+                <a:pPr/>
                 <a14:m>
                   <m:oMathPara xmlns:m="http://schemas.openxmlformats.org/officeDocument/2006/math">
                     <m:oMathParaPr>
@@ -5206,7 +5222,7 @@
             </p:txBody>
           </p:sp>
         </mc:Choice>
-        <mc:Fallback>
+        <mc:Fallback xmlns="">
           <p:sp>
             <p:nvSpPr>
               <p:cNvPr id="4" name="TextBox 3">
@@ -5251,8 +5267,8 @@
           </p:sp>
         </mc:Fallback>
       </mc:AlternateContent>
-      <mc:AlternateContent xmlns:mc="http://schemas.openxmlformats.org/markup-compatibility/2006">
-        <mc:Choice xmlns:a14="http://schemas.microsoft.com/office/drawing/2010/main" Requires="a14">
+      <mc:AlternateContent xmlns:mc="http://schemas.openxmlformats.org/markup-compatibility/2006" xmlns:a14="http://schemas.microsoft.com/office/drawing/2010/main">
+        <mc:Choice Requires="a14">
           <p:sp>
             <p:nvSpPr>
               <p:cNvPr id="5" name="TextBox 4">
@@ -5281,6 +5297,7 @@
               </a:bodyPr>
               <a:lstStyle/>
               <a:p>
+                <a:pPr/>
                 <a14:m>
                   <m:oMathPara xmlns:m="http://schemas.openxmlformats.org/officeDocument/2006/math">
                     <m:oMathParaPr>
@@ -5364,7 +5381,7 @@
             </p:txBody>
           </p:sp>
         </mc:Choice>
-        <mc:Fallback>
+        <mc:Fallback xmlns="">
           <p:sp>
             <p:nvSpPr>
               <p:cNvPr id="5" name="TextBox 4">
@@ -5559,6 +5576,2729 @@
     <p:extLst>
       <p:ext uri="{BB962C8B-B14F-4D97-AF65-F5344CB8AC3E}">
         <p14:creationId xmlns:p14="http://schemas.microsoft.com/office/powerpoint/2010/main" val="3787239410"/>
+      </p:ext>
+    </p:extLst>
+  </p:cSld>
+  <p:clrMapOvr>
+    <a:masterClrMapping/>
+  </p:clrMapOvr>
+</p:sld>
+</file>
+
+<file path=ppt/slides/slide6.xml><?xml version="1.0" encoding="utf-8"?>
+<p:sld xmlns:a="http://schemas.openxmlformats.org/drawingml/2006/main" xmlns:r="http://schemas.openxmlformats.org/officeDocument/2006/relationships" xmlns:p="http://schemas.openxmlformats.org/presentationml/2006/main">
+  <p:cSld>
+    <p:spTree>
+      <p:nvGrpSpPr>
+        <p:cNvPr id="1" name=""/>
+        <p:cNvGrpSpPr/>
+        <p:nvPr/>
+      </p:nvGrpSpPr>
+      <p:grpSpPr>
+        <a:xfrm>
+          <a:off x="0" y="0"/>
+          <a:ext cx="0" cy="0"/>
+          <a:chOff x="0" y="0"/>
+          <a:chExt cx="0" cy="0"/>
+        </a:xfrm>
+      </p:grpSpPr>
+      <p:pic>
+        <p:nvPicPr>
+          <p:cNvPr id="2" name="Picture 1">
+            <a:extLst>
+              <a:ext uri="{FF2B5EF4-FFF2-40B4-BE49-F238E27FC236}">
+                <a16:creationId xmlns:a16="http://schemas.microsoft.com/office/drawing/2014/main" id="{DB9F2DCF-4BFE-5B34-52D9-EB686F405B7A}"/>
+              </a:ext>
+            </a:extLst>
+          </p:cNvPr>
+          <p:cNvPicPr>
+            <a:picLocks noChangeAspect="1"/>
+          </p:cNvPicPr>
+          <p:nvPr/>
+        </p:nvPicPr>
+        <p:blipFill>
+          <a:blip r:embed="rId2"/>
+          <a:stretch>
+            <a:fillRect/>
+          </a:stretch>
+        </p:blipFill>
+        <p:spPr>
+          <a:xfrm>
+            <a:off x="248293" y="181899"/>
+            <a:ext cx="7226206" cy="6494201"/>
+          </a:xfrm>
+          <a:prstGeom prst="rect">
+            <a:avLst/>
+          </a:prstGeom>
+        </p:spPr>
+      </p:pic>
+      <p:sp>
+        <p:nvSpPr>
+          <p:cNvPr id="3" name="TextBox 2">
+            <a:extLst>
+              <a:ext uri="{FF2B5EF4-FFF2-40B4-BE49-F238E27FC236}">
+                <a16:creationId xmlns:a16="http://schemas.microsoft.com/office/drawing/2014/main" id="{E9276A05-C4E8-9948-7052-969BFE500973}"/>
+              </a:ext>
+            </a:extLst>
+          </p:cNvPr>
+          <p:cNvSpPr txBox="1"/>
+          <p:nvPr/>
+        </p:nvSpPr>
+        <p:spPr>
+          <a:xfrm>
+            <a:off x="7789762" y="181899"/>
+            <a:ext cx="4259483" cy="1200329"/>
+          </a:xfrm>
+          <a:prstGeom prst="rect">
+            <a:avLst/>
+          </a:prstGeom>
+          <a:noFill/>
+        </p:spPr>
+        <p:txBody>
+          <a:bodyPr wrap="square" rtlCol="0">
+            <a:spAutoFit/>
+          </a:bodyPr>
+          <a:lstStyle/>
+          <a:p>
+            <a:r>
+              <a:rPr lang="en-US" dirty="0"/>
+              <a:t>Environmental variance ratio f/m:  1.2 / 1</a:t>
+            </a:r>
+          </a:p>
+          <a:p>
+            <a:r>
+              <a:rPr lang="en-US" dirty="0" err="1"/>
+              <a:t>snps</a:t>
+            </a:r>
+            <a:r>
+              <a:rPr lang="en-US" dirty="0"/>
+              <a:t>: 1000</a:t>
+            </a:r>
+          </a:p>
+          <a:p>
+            <a:endParaRPr lang="en-US" dirty="0"/>
+          </a:p>
+          <a:p>
+            <a:endParaRPr lang="en-US" dirty="0"/>
+          </a:p>
+        </p:txBody>
+      </p:sp>
+      <p:sp>
+        <p:nvSpPr>
+          <p:cNvPr id="4" name="TextBox 3">
+            <a:extLst>
+              <a:ext uri="{FF2B5EF4-FFF2-40B4-BE49-F238E27FC236}">
+                <a16:creationId xmlns:a16="http://schemas.microsoft.com/office/drawing/2014/main" id="{36917DDD-57C3-643B-678F-98F5DBB4F4D2}"/>
+              </a:ext>
+            </a:extLst>
+          </p:cNvPr>
+          <p:cNvSpPr txBox="1"/>
+          <p:nvPr/>
+        </p:nvSpPr>
+        <p:spPr>
+          <a:xfrm>
+            <a:off x="10579260" y="1666755"/>
+            <a:ext cx="613458" cy="369332"/>
+          </a:xfrm>
+          <a:prstGeom prst="rect">
+            <a:avLst/>
+          </a:prstGeom>
+          <a:noFill/>
+        </p:spPr>
+        <p:txBody>
+          <a:bodyPr wrap="square" rtlCol="0">
+            <a:spAutoFit/>
+          </a:bodyPr>
+          <a:lstStyle/>
+          <a:p>
+            <a:r>
+              <a:rPr lang="en-US" dirty="0"/>
+              <a:t>10x</a:t>
+            </a:r>
+          </a:p>
+        </p:txBody>
+      </p:sp>
+      <p:sp>
+        <p:nvSpPr>
+          <p:cNvPr id="6" name="TextBox 5">
+            <a:extLst>
+              <a:ext uri="{FF2B5EF4-FFF2-40B4-BE49-F238E27FC236}">
+                <a16:creationId xmlns:a16="http://schemas.microsoft.com/office/drawing/2014/main" id="{B4948DB9-E377-0F7F-75AB-729C8EE72C24}"/>
+              </a:ext>
+            </a:extLst>
+          </p:cNvPr>
+          <p:cNvSpPr txBox="1"/>
+          <p:nvPr/>
+        </p:nvSpPr>
+        <p:spPr>
+          <a:xfrm>
+            <a:off x="10395994" y="4637248"/>
+            <a:ext cx="796724" cy="369332"/>
+          </a:xfrm>
+          <a:prstGeom prst="rect">
+            <a:avLst/>
+          </a:prstGeom>
+          <a:noFill/>
+        </p:spPr>
+        <p:txBody>
+          <a:bodyPr wrap="square" rtlCol="0">
+            <a:spAutoFit/>
+          </a:bodyPr>
+          <a:lstStyle/>
+          <a:p>
+            <a:r>
+              <a:rPr lang="en-US" dirty="0"/>
+              <a:t>100x</a:t>
+            </a:r>
+          </a:p>
+        </p:txBody>
+      </p:sp>
+    </p:spTree>
+    <p:extLst>
+      <p:ext uri="{BB962C8B-B14F-4D97-AF65-F5344CB8AC3E}">
+        <p14:creationId xmlns:p14="http://schemas.microsoft.com/office/powerpoint/2010/main" val="4232663401"/>
+      </p:ext>
+    </p:extLst>
+  </p:cSld>
+  <p:clrMapOvr>
+    <a:masterClrMapping/>
+  </p:clrMapOvr>
+</p:sld>
+</file>
+
+<file path=ppt/slides/slide7.xml><?xml version="1.0" encoding="utf-8"?>
+<p:sld xmlns:a="http://schemas.openxmlformats.org/drawingml/2006/main" xmlns:r="http://schemas.openxmlformats.org/officeDocument/2006/relationships" xmlns:p="http://schemas.openxmlformats.org/presentationml/2006/main">
+  <p:cSld>
+    <p:spTree>
+      <p:nvGrpSpPr>
+        <p:cNvPr id="1" name=""/>
+        <p:cNvGrpSpPr/>
+        <p:nvPr/>
+      </p:nvGrpSpPr>
+      <p:grpSpPr>
+        <a:xfrm>
+          <a:off x="0" y="0"/>
+          <a:ext cx="0" cy="0"/>
+          <a:chOff x="0" y="0"/>
+          <a:chExt cx="0" cy="0"/>
+        </a:xfrm>
+      </p:grpSpPr>
+      <p:pic>
+        <p:nvPicPr>
+          <p:cNvPr id="3" name="Picture 2">
+            <a:extLst>
+              <a:ext uri="{FF2B5EF4-FFF2-40B4-BE49-F238E27FC236}">
+                <a16:creationId xmlns:a16="http://schemas.microsoft.com/office/drawing/2014/main" id="{92DF6FEC-0F31-EE57-1FE7-9BC2AF2B2F5F}"/>
+              </a:ext>
+            </a:extLst>
+          </p:cNvPr>
+          <p:cNvPicPr>
+            <a:picLocks noChangeAspect="1"/>
+          </p:cNvPicPr>
+          <p:nvPr/>
+        </p:nvPicPr>
+        <p:blipFill>
+          <a:blip r:embed="rId2">
+            <a:extLst>
+              <a:ext uri="{28A0092B-C50C-407E-A947-70E740481C1C}">
+                <a14:useLocalDpi xmlns:a14="http://schemas.microsoft.com/office/drawing/2010/main" val="0"/>
+              </a:ext>
+            </a:extLst>
+          </a:blip>
+          <a:stretch>
+            <a:fillRect/>
+          </a:stretch>
+        </p:blipFill>
+        <p:spPr>
+          <a:xfrm>
+            <a:off x="0" y="323315"/>
+            <a:ext cx="8495818" cy="6262943"/>
+          </a:xfrm>
+          <a:prstGeom prst="rect">
+            <a:avLst/>
+          </a:prstGeom>
+        </p:spPr>
+      </p:pic>
+      <mc:AlternateContent xmlns:mc="http://schemas.openxmlformats.org/markup-compatibility/2006" xmlns:a14="http://schemas.microsoft.com/office/drawing/2010/main">
+        <mc:Choice Requires="a14">
+          <p:sp>
+            <p:nvSpPr>
+              <p:cNvPr id="4" name="TextBox 3">
+                <a:extLst>
+                  <a:ext uri="{FF2B5EF4-FFF2-40B4-BE49-F238E27FC236}">
+                    <a16:creationId xmlns:a16="http://schemas.microsoft.com/office/drawing/2014/main" id="{246423E9-EEE1-E2FE-4C2D-BDD698C4D243}"/>
+                  </a:ext>
+                </a:extLst>
+              </p:cNvPr>
+              <p:cNvSpPr txBox="1"/>
+              <p:nvPr/>
+            </p:nvSpPr>
+            <p:spPr>
+              <a:xfrm>
+                <a:off x="9902142" y="2350036"/>
+                <a:ext cx="1100622" cy="715645"/>
+              </a:xfrm>
+              <a:prstGeom prst="rect">
+                <a:avLst/>
+              </a:prstGeom>
+              <a:noFill/>
+            </p:spPr>
+            <p:txBody>
+              <a:bodyPr wrap="none" lIns="0" tIns="0" rIns="0" bIns="0" rtlCol="0">
+                <a:spAutoFit/>
+              </a:bodyPr>
+              <a:lstStyle/>
+              <a:p>
+                <a:pPr/>
+                <a14:m>
+                  <m:oMathPara xmlns:m="http://schemas.openxmlformats.org/officeDocument/2006/math">
+                    <m:oMathParaPr>
+                      <m:jc m:val="centerGroup"/>
+                    </m:oMathParaPr>
+                    <m:oMath xmlns:m="http://schemas.openxmlformats.org/officeDocument/2006/math">
+                      <m:d>
+                        <m:dPr>
+                          <m:begChr m:val="["/>
+                          <m:endChr m:val="]"/>
+                          <m:ctrlPr>
+                            <a:rPr lang="en-US" sz="2800" i="1" smtClean="0">
+                              <a:latin typeface="Cambria Math" panose="02040503050406030204" pitchFamily="18" charset="0"/>
+                            </a:rPr>
+                          </m:ctrlPr>
+                        </m:dPr>
+                        <m:e>
+                          <m:m>
+                            <m:mPr>
+                              <m:mcs>
+                                <m:mc>
+                                  <m:mcPr>
+                                    <m:count m:val="2"/>
+                                    <m:mcJc m:val="center"/>
+                                  </m:mcPr>
+                                </m:mc>
+                              </m:mcs>
+                              <m:ctrlPr>
+                                <a:rPr lang="en-US" sz="2800" i="1" smtClean="0">
+                                  <a:latin typeface="Cambria Math" panose="02040503050406030204" pitchFamily="18" charset="0"/>
+                                </a:rPr>
+                              </m:ctrlPr>
+                            </m:mPr>
+                            <m:mr>
+                              <m:e>
+                                <m:r>
+                                  <m:rPr>
+                                    <m:brk m:alnAt="7"/>
+                                  </m:rPr>
+                                  <a:rPr lang="en-US" sz="2800" b="0" i="1" smtClean="0">
+                                    <a:latin typeface="Cambria Math" panose="02040503050406030204" pitchFamily="18" charset="0"/>
+                                  </a:rPr>
+                                  <m:t>1</m:t>
+                                </m:r>
+                              </m:e>
+                              <m:e>
+                                <m:r>
+                                  <a:rPr lang="en-US" sz="2800" b="0" i="1" smtClean="0">
+                                    <a:latin typeface="Cambria Math" panose="02040503050406030204" pitchFamily="18" charset="0"/>
+                                  </a:rPr>
+                                  <m:t>1</m:t>
+                                </m:r>
+                              </m:e>
+                            </m:mr>
+                            <m:mr>
+                              <m:e>
+                                <m:r>
+                                  <a:rPr lang="en-US" sz="2800" b="0" i="1" smtClean="0">
+                                    <a:latin typeface="Cambria Math" panose="02040503050406030204" pitchFamily="18" charset="0"/>
+                                  </a:rPr>
+                                  <m:t>1</m:t>
+                                </m:r>
+                              </m:e>
+                              <m:e>
+                                <m:r>
+                                  <a:rPr lang="en-US" sz="2800" b="0" i="1" smtClean="0">
+                                    <a:latin typeface="Cambria Math" panose="02040503050406030204" pitchFamily="18" charset="0"/>
+                                  </a:rPr>
+                                  <m:t>1</m:t>
+                                </m:r>
+                              </m:e>
+                            </m:mr>
+                          </m:m>
+                        </m:e>
+                      </m:d>
+                    </m:oMath>
+                  </m:oMathPara>
+                </a14:m>
+                <a:endParaRPr lang="en-US" sz="2800" dirty="0"/>
+              </a:p>
+            </p:txBody>
+          </p:sp>
+        </mc:Choice>
+        <mc:Fallback xmlns="">
+          <p:sp>
+            <p:nvSpPr>
+              <p:cNvPr id="4" name="TextBox 3">
+                <a:extLst>
+                  <a:ext uri="{FF2B5EF4-FFF2-40B4-BE49-F238E27FC236}">
+                    <a16:creationId xmlns:a16="http://schemas.microsoft.com/office/drawing/2014/main" id="{246423E9-EEE1-E2FE-4C2D-BDD698C4D243}"/>
+                  </a:ext>
+                </a:extLst>
+              </p:cNvPr>
+              <p:cNvSpPr txBox="1">
+                <a:spLocks noRot="1" noChangeAspect="1" noMove="1" noResize="1" noEditPoints="1" noAdjustHandles="1" noChangeArrowheads="1" noChangeShapeType="1" noTextEdit="1"/>
+              </p:cNvSpPr>
+              <p:nvPr/>
+            </p:nvSpPr>
+            <p:spPr>
+              <a:xfrm>
+                <a:off x="9902142" y="2350036"/>
+                <a:ext cx="1100622" cy="715645"/>
+              </a:xfrm>
+              <a:prstGeom prst="rect">
+                <a:avLst/>
+              </a:prstGeom>
+              <a:blipFill>
+                <a:blip r:embed="rId3"/>
+                <a:stretch>
+                  <a:fillRect t="-1754" b="-15789"/>
+                </a:stretch>
+              </a:blipFill>
+            </p:spPr>
+            <p:txBody>
+              <a:bodyPr/>
+              <a:lstStyle/>
+              <a:p>
+                <a:r>
+                  <a:rPr lang="en-US">
+                    <a:noFill/>
+                  </a:rPr>
+                  <a:t> </a:t>
+                </a:r>
+              </a:p>
+            </p:txBody>
+          </p:sp>
+        </mc:Fallback>
+      </mc:AlternateContent>
+      <p:sp>
+        <p:nvSpPr>
+          <p:cNvPr id="5" name="TextBox 4">
+            <a:extLst>
+              <a:ext uri="{FF2B5EF4-FFF2-40B4-BE49-F238E27FC236}">
+                <a16:creationId xmlns:a16="http://schemas.microsoft.com/office/drawing/2014/main" id="{698FB627-2CF7-A2E9-F12E-13B781FC6CB6}"/>
+              </a:ext>
+            </a:extLst>
+          </p:cNvPr>
+          <p:cNvSpPr txBox="1"/>
+          <p:nvPr/>
+        </p:nvSpPr>
+        <p:spPr>
+          <a:xfrm>
+            <a:off x="9702117" y="1980704"/>
+            <a:ext cx="1666875" cy="369332"/>
+          </a:xfrm>
+          <a:prstGeom prst="rect">
+            <a:avLst/>
+          </a:prstGeom>
+          <a:noFill/>
+        </p:spPr>
+        <p:txBody>
+          <a:bodyPr wrap="square" rtlCol="0">
+            <a:spAutoFit/>
+          </a:bodyPr>
+          <a:lstStyle/>
+          <a:p>
+            <a:r>
+              <a:rPr lang="en-US" dirty="0"/>
+              <a:t>female   male</a:t>
+            </a:r>
+          </a:p>
+        </p:txBody>
+      </p:sp>
+      <p:sp>
+        <p:nvSpPr>
+          <p:cNvPr id="6" name="TextBox 5">
+            <a:extLst>
+              <a:ext uri="{FF2B5EF4-FFF2-40B4-BE49-F238E27FC236}">
+                <a16:creationId xmlns:a16="http://schemas.microsoft.com/office/drawing/2014/main" id="{B1485F02-78C4-4F41-A970-6073F7DD55FD}"/>
+              </a:ext>
+            </a:extLst>
+          </p:cNvPr>
+          <p:cNvSpPr txBox="1"/>
+          <p:nvPr/>
+        </p:nvSpPr>
+        <p:spPr>
+          <a:xfrm>
+            <a:off x="9068704" y="2396549"/>
+            <a:ext cx="1666875" cy="646331"/>
+          </a:xfrm>
+          <a:prstGeom prst="rect">
+            <a:avLst/>
+          </a:prstGeom>
+          <a:noFill/>
+        </p:spPr>
+        <p:txBody>
+          <a:bodyPr wrap="square" rtlCol="0">
+            <a:spAutoFit/>
+          </a:bodyPr>
+          <a:lstStyle/>
+          <a:p>
+            <a:r>
+              <a:rPr lang="en-US" dirty="0"/>
+              <a:t>female</a:t>
+            </a:r>
+          </a:p>
+          <a:p>
+            <a:r>
+              <a:rPr lang="en-US" dirty="0"/>
+              <a:t>male</a:t>
+            </a:r>
+          </a:p>
+        </p:txBody>
+      </p:sp>
+      <p:sp>
+        <p:nvSpPr>
+          <p:cNvPr id="7" name="TextBox 6">
+            <a:extLst>
+              <a:ext uri="{FF2B5EF4-FFF2-40B4-BE49-F238E27FC236}">
+                <a16:creationId xmlns:a16="http://schemas.microsoft.com/office/drawing/2014/main" id="{02EB618A-0E2B-C427-3D94-2CEB31437DF3}"/>
+              </a:ext>
+            </a:extLst>
+          </p:cNvPr>
+          <p:cNvSpPr txBox="1"/>
+          <p:nvPr/>
+        </p:nvSpPr>
+        <p:spPr>
+          <a:xfrm>
+            <a:off x="10986137" y="2396549"/>
+            <a:ext cx="1005235" cy="461665"/>
+          </a:xfrm>
+          <a:prstGeom prst="rect">
+            <a:avLst/>
+          </a:prstGeom>
+          <a:noFill/>
+        </p:spPr>
+        <p:txBody>
+          <a:bodyPr wrap="square" rtlCol="0">
+            <a:spAutoFit/>
+          </a:bodyPr>
+          <a:lstStyle/>
+          <a:p>
+            <a:r>
+              <a:rPr lang="en-US" sz="2400" dirty="0"/>
+              <a:t>100%</a:t>
+            </a:r>
+          </a:p>
+        </p:txBody>
+      </p:sp>
+    </p:spTree>
+    <p:extLst>
+      <p:ext uri="{BB962C8B-B14F-4D97-AF65-F5344CB8AC3E}">
+        <p14:creationId xmlns:p14="http://schemas.microsoft.com/office/powerpoint/2010/main" val="1823324425"/>
+      </p:ext>
+    </p:extLst>
+  </p:cSld>
+  <p:clrMapOvr>
+    <a:masterClrMapping/>
+  </p:clrMapOvr>
+</p:sld>
+</file>
+
+<file path=ppt/slides/slide8.xml><?xml version="1.0" encoding="utf-8"?>
+<p:sld xmlns:a="http://schemas.openxmlformats.org/drawingml/2006/main" xmlns:r="http://schemas.openxmlformats.org/officeDocument/2006/relationships" xmlns:p="http://schemas.openxmlformats.org/presentationml/2006/main">
+  <p:cSld>
+    <p:spTree>
+      <p:nvGrpSpPr>
+        <p:cNvPr id="1" name=""/>
+        <p:cNvGrpSpPr/>
+        <p:nvPr/>
+      </p:nvGrpSpPr>
+      <p:grpSpPr>
+        <a:xfrm>
+          <a:off x="0" y="0"/>
+          <a:ext cx="0" cy="0"/>
+          <a:chOff x="0" y="0"/>
+          <a:chExt cx="0" cy="0"/>
+        </a:xfrm>
+      </p:grpSpPr>
+      <p:pic>
+        <p:nvPicPr>
+          <p:cNvPr id="3" name="Picture 2" descr="Table&#10;&#10;Description automatically generated with medium confidence">
+            <a:extLst>
+              <a:ext uri="{FF2B5EF4-FFF2-40B4-BE49-F238E27FC236}">
+                <a16:creationId xmlns:a16="http://schemas.microsoft.com/office/drawing/2014/main" id="{3F01701F-1454-4833-9779-B2E44621F00D}"/>
+              </a:ext>
+            </a:extLst>
+          </p:cNvPr>
+          <p:cNvPicPr>
+            <a:picLocks noChangeAspect="1"/>
+          </p:cNvPicPr>
+          <p:nvPr/>
+        </p:nvPicPr>
+        <p:blipFill>
+          <a:blip r:embed="rId2">
+            <a:extLst>
+              <a:ext uri="{28A0092B-C50C-407E-A947-70E740481C1C}">
+                <a14:useLocalDpi xmlns:a14="http://schemas.microsoft.com/office/drawing/2010/main" val="0"/>
+              </a:ext>
+            </a:extLst>
+          </a:blip>
+          <a:stretch>
+            <a:fillRect/>
+          </a:stretch>
+        </p:blipFill>
+        <p:spPr>
+          <a:xfrm>
+            <a:off x="341392" y="0"/>
+            <a:ext cx="9286875" cy="6858000"/>
+          </a:xfrm>
+          <a:prstGeom prst="rect">
+            <a:avLst/>
+          </a:prstGeom>
+        </p:spPr>
+      </p:pic>
+      <mc:AlternateContent xmlns:mc="http://schemas.openxmlformats.org/markup-compatibility/2006" xmlns:a14="http://schemas.microsoft.com/office/drawing/2010/main">
+        <mc:Choice Requires="a14">
+          <p:sp>
+            <p:nvSpPr>
+              <p:cNvPr id="4" name="TextBox 3">
+                <a:extLst>
+                  <a:ext uri="{FF2B5EF4-FFF2-40B4-BE49-F238E27FC236}">
+                    <a16:creationId xmlns:a16="http://schemas.microsoft.com/office/drawing/2014/main" id="{56503A6A-E476-9098-25AD-6CF8F2D89F11}"/>
+                  </a:ext>
+                </a:extLst>
+              </p:cNvPr>
+              <p:cNvSpPr txBox="1"/>
+              <p:nvPr/>
+            </p:nvSpPr>
+            <p:spPr>
+              <a:xfrm>
+                <a:off x="10353555" y="1968071"/>
+                <a:ext cx="1100622" cy="715645"/>
+              </a:xfrm>
+              <a:prstGeom prst="rect">
+                <a:avLst/>
+              </a:prstGeom>
+              <a:noFill/>
+            </p:spPr>
+            <p:txBody>
+              <a:bodyPr wrap="none" lIns="0" tIns="0" rIns="0" bIns="0" rtlCol="0">
+                <a:spAutoFit/>
+              </a:bodyPr>
+              <a:lstStyle/>
+              <a:p>
+                <a:pPr/>
+                <a14:m>
+                  <m:oMathPara xmlns:m="http://schemas.openxmlformats.org/officeDocument/2006/math">
+                    <m:oMathParaPr>
+                      <m:jc m:val="centerGroup"/>
+                    </m:oMathParaPr>
+                    <m:oMath xmlns:m="http://schemas.openxmlformats.org/officeDocument/2006/math">
+                      <m:d>
+                        <m:dPr>
+                          <m:begChr m:val="["/>
+                          <m:endChr m:val="]"/>
+                          <m:ctrlPr>
+                            <a:rPr lang="en-US" sz="2800" i="1" smtClean="0">
+                              <a:latin typeface="Cambria Math" panose="02040503050406030204" pitchFamily="18" charset="0"/>
+                            </a:rPr>
+                          </m:ctrlPr>
+                        </m:dPr>
+                        <m:e>
+                          <m:m>
+                            <m:mPr>
+                              <m:mcs>
+                                <m:mc>
+                                  <m:mcPr>
+                                    <m:count m:val="2"/>
+                                    <m:mcJc m:val="center"/>
+                                  </m:mcPr>
+                                </m:mc>
+                              </m:mcs>
+                              <m:ctrlPr>
+                                <a:rPr lang="en-US" sz="2800" i="1" smtClean="0">
+                                  <a:latin typeface="Cambria Math" panose="02040503050406030204" pitchFamily="18" charset="0"/>
+                                </a:rPr>
+                              </m:ctrlPr>
+                            </m:mPr>
+                            <m:mr>
+                              <m:e>
+                                <m:r>
+                                  <m:rPr>
+                                    <m:brk m:alnAt="7"/>
+                                  </m:rPr>
+                                  <a:rPr lang="en-US" sz="2800" b="0" i="1" smtClean="0">
+                                    <a:latin typeface="Cambria Math" panose="02040503050406030204" pitchFamily="18" charset="0"/>
+                                  </a:rPr>
+                                  <m:t>1</m:t>
+                                </m:r>
+                              </m:e>
+                              <m:e>
+                                <m:r>
+                                  <a:rPr lang="en-US" sz="2800" b="0" i="1" smtClean="0">
+                                    <a:latin typeface="Cambria Math" panose="02040503050406030204" pitchFamily="18" charset="0"/>
+                                  </a:rPr>
+                                  <m:t>1</m:t>
+                                </m:r>
+                              </m:e>
+                            </m:mr>
+                            <m:mr>
+                              <m:e>
+                                <m:r>
+                                  <a:rPr lang="en-US" sz="2800" b="0" i="1" smtClean="0">
+                                    <a:latin typeface="Cambria Math" panose="02040503050406030204" pitchFamily="18" charset="0"/>
+                                  </a:rPr>
+                                  <m:t>1</m:t>
+                                </m:r>
+                              </m:e>
+                              <m:e>
+                                <m:r>
+                                  <a:rPr lang="en-US" sz="2800" b="0" i="1" smtClean="0">
+                                    <a:latin typeface="Cambria Math" panose="02040503050406030204" pitchFamily="18" charset="0"/>
+                                  </a:rPr>
+                                  <m:t>1</m:t>
+                                </m:r>
+                              </m:e>
+                            </m:mr>
+                          </m:m>
+                        </m:e>
+                      </m:d>
+                    </m:oMath>
+                  </m:oMathPara>
+                </a14:m>
+                <a:endParaRPr lang="en-US" sz="2800" dirty="0"/>
+              </a:p>
+            </p:txBody>
+          </p:sp>
+        </mc:Choice>
+        <mc:Fallback xmlns="">
+          <p:sp>
+            <p:nvSpPr>
+              <p:cNvPr id="4" name="TextBox 3">
+                <a:extLst>
+                  <a:ext uri="{FF2B5EF4-FFF2-40B4-BE49-F238E27FC236}">
+                    <a16:creationId xmlns:a16="http://schemas.microsoft.com/office/drawing/2014/main" id="{56503A6A-E476-9098-25AD-6CF8F2D89F11}"/>
+                  </a:ext>
+                </a:extLst>
+              </p:cNvPr>
+              <p:cNvSpPr txBox="1">
+                <a:spLocks noRot="1" noChangeAspect="1" noMove="1" noResize="1" noEditPoints="1" noAdjustHandles="1" noChangeArrowheads="1" noChangeShapeType="1" noTextEdit="1"/>
+              </p:cNvSpPr>
+              <p:nvPr/>
+            </p:nvSpPr>
+            <p:spPr>
+              <a:xfrm>
+                <a:off x="10353555" y="1968071"/>
+                <a:ext cx="1100622" cy="715645"/>
+              </a:xfrm>
+              <a:prstGeom prst="rect">
+                <a:avLst/>
+              </a:prstGeom>
+              <a:blipFill>
+                <a:blip r:embed="rId3"/>
+                <a:stretch>
+                  <a:fillRect t="-1754" b="-15789"/>
+                </a:stretch>
+              </a:blipFill>
+            </p:spPr>
+            <p:txBody>
+              <a:bodyPr/>
+              <a:lstStyle/>
+              <a:p>
+                <a:r>
+                  <a:rPr lang="en-US">
+                    <a:noFill/>
+                  </a:rPr>
+                  <a:t> </a:t>
+                </a:r>
+              </a:p>
+            </p:txBody>
+          </p:sp>
+        </mc:Fallback>
+      </mc:AlternateContent>
+      <mc:AlternateContent xmlns:mc="http://schemas.openxmlformats.org/markup-compatibility/2006" xmlns:a14="http://schemas.microsoft.com/office/drawing/2010/main">
+        <mc:Choice Requires="a14">
+          <p:sp>
+            <p:nvSpPr>
+              <p:cNvPr id="5" name="TextBox 4">
+                <a:extLst>
+                  <a:ext uri="{FF2B5EF4-FFF2-40B4-BE49-F238E27FC236}">
+                    <a16:creationId xmlns:a16="http://schemas.microsoft.com/office/drawing/2014/main" id="{D98EA905-0D28-CDA2-F5E6-D5689514F4D4}"/>
+                  </a:ext>
+                </a:extLst>
+              </p:cNvPr>
+              <p:cNvSpPr txBox="1"/>
+              <p:nvPr/>
+            </p:nvSpPr>
+            <p:spPr>
+              <a:xfrm>
+                <a:off x="10353555" y="3841697"/>
+                <a:ext cx="1100621" cy="715645"/>
+              </a:xfrm>
+              <a:prstGeom prst="rect">
+                <a:avLst/>
+              </a:prstGeom>
+              <a:noFill/>
+            </p:spPr>
+            <p:txBody>
+              <a:bodyPr wrap="none" lIns="0" tIns="0" rIns="0" bIns="0" rtlCol="0">
+                <a:spAutoFit/>
+              </a:bodyPr>
+              <a:lstStyle/>
+              <a:p>
+                <a:pPr/>
+                <a14:m>
+                  <m:oMathPara xmlns:m="http://schemas.openxmlformats.org/officeDocument/2006/math">
+                    <m:oMathParaPr>
+                      <m:jc m:val="centerGroup"/>
+                    </m:oMathParaPr>
+                    <m:oMath xmlns:m="http://schemas.openxmlformats.org/officeDocument/2006/math">
+                      <m:d>
+                        <m:dPr>
+                          <m:begChr m:val="["/>
+                          <m:endChr m:val="]"/>
+                          <m:ctrlPr>
+                            <a:rPr lang="en-US" sz="2800" i="1" smtClean="0">
+                              <a:latin typeface="Cambria Math" panose="02040503050406030204" pitchFamily="18" charset="0"/>
+                            </a:rPr>
+                          </m:ctrlPr>
+                        </m:dPr>
+                        <m:e>
+                          <m:m>
+                            <m:mPr>
+                              <m:mcs>
+                                <m:mc>
+                                  <m:mcPr>
+                                    <m:count m:val="2"/>
+                                    <m:mcJc m:val="center"/>
+                                  </m:mcPr>
+                                </m:mc>
+                              </m:mcs>
+                              <m:ctrlPr>
+                                <a:rPr lang="en-US" sz="2800" i="1" smtClean="0">
+                                  <a:latin typeface="Cambria Math" panose="02040503050406030204" pitchFamily="18" charset="0"/>
+                                </a:rPr>
+                              </m:ctrlPr>
+                            </m:mPr>
+                            <m:mr>
+                              <m:e>
+                                <m:r>
+                                  <m:rPr>
+                                    <m:brk m:alnAt="7"/>
+                                  </m:rPr>
+                                  <a:rPr lang="en-US" sz="2800" b="0" i="1" smtClean="0">
+                                    <a:latin typeface="Cambria Math" panose="02040503050406030204" pitchFamily="18" charset="0"/>
+                                  </a:rPr>
+                                  <m:t>4</m:t>
+                                </m:r>
+                              </m:e>
+                              <m:e>
+                                <m:r>
+                                  <a:rPr lang="en-US" sz="2800" b="0" i="1" smtClean="0">
+                                    <a:latin typeface="Cambria Math" panose="02040503050406030204" pitchFamily="18" charset="0"/>
+                                  </a:rPr>
+                                  <m:t>2</m:t>
+                                </m:r>
+                              </m:e>
+                            </m:mr>
+                            <m:mr>
+                              <m:e>
+                                <m:r>
+                                  <a:rPr lang="en-US" sz="2800" b="0" i="1" smtClean="0">
+                                    <a:latin typeface="Cambria Math" panose="02040503050406030204" pitchFamily="18" charset="0"/>
+                                  </a:rPr>
+                                  <m:t>2</m:t>
+                                </m:r>
+                              </m:e>
+                              <m:e>
+                                <m:r>
+                                  <a:rPr lang="en-US" sz="2800" b="0" i="1" smtClean="0">
+                                    <a:latin typeface="Cambria Math" panose="02040503050406030204" pitchFamily="18" charset="0"/>
+                                  </a:rPr>
+                                  <m:t>1</m:t>
+                                </m:r>
+                              </m:e>
+                            </m:mr>
+                          </m:m>
+                        </m:e>
+                      </m:d>
+                    </m:oMath>
+                  </m:oMathPara>
+                </a14:m>
+                <a:endParaRPr lang="en-US" sz="2800" dirty="0"/>
+              </a:p>
+            </p:txBody>
+          </p:sp>
+        </mc:Choice>
+        <mc:Fallback xmlns="">
+          <p:sp>
+            <p:nvSpPr>
+              <p:cNvPr id="5" name="TextBox 4">
+                <a:extLst>
+                  <a:ext uri="{FF2B5EF4-FFF2-40B4-BE49-F238E27FC236}">
+                    <a16:creationId xmlns:a16="http://schemas.microsoft.com/office/drawing/2014/main" id="{D98EA905-0D28-CDA2-F5E6-D5689514F4D4}"/>
+                  </a:ext>
+                </a:extLst>
+              </p:cNvPr>
+              <p:cNvSpPr txBox="1">
+                <a:spLocks noRot="1" noChangeAspect="1" noMove="1" noResize="1" noEditPoints="1" noAdjustHandles="1" noChangeArrowheads="1" noChangeShapeType="1" noTextEdit="1"/>
+              </p:cNvSpPr>
+              <p:nvPr/>
+            </p:nvSpPr>
+            <p:spPr>
+              <a:xfrm>
+                <a:off x="10353555" y="3841697"/>
+                <a:ext cx="1100621" cy="715645"/>
+              </a:xfrm>
+              <a:prstGeom prst="rect">
+                <a:avLst/>
+              </a:prstGeom>
+              <a:blipFill>
+                <a:blip r:embed="rId4"/>
+                <a:stretch>
+                  <a:fillRect t="-1724" b="-15517"/>
+                </a:stretch>
+              </a:blipFill>
+            </p:spPr>
+            <p:txBody>
+              <a:bodyPr/>
+              <a:lstStyle/>
+              <a:p>
+                <a:r>
+                  <a:rPr lang="en-US">
+                    <a:noFill/>
+                  </a:rPr>
+                  <a:t> </a:t>
+                </a:r>
+              </a:p>
+            </p:txBody>
+          </p:sp>
+        </mc:Fallback>
+      </mc:AlternateContent>
+      <p:sp>
+        <p:nvSpPr>
+          <p:cNvPr id="6" name="TextBox 5">
+            <a:extLst>
+              <a:ext uri="{FF2B5EF4-FFF2-40B4-BE49-F238E27FC236}">
+                <a16:creationId xmlns:a16="http://schemas.microsoft.com/office/drawing/2014/main" id="{5F04205A-DC43-13EC-7CA7-928B3F238999}"/>
+              </a:ext>
+            </a:extLst>
+          </p:cNvPr>
+          <p:cNvSpPr txBox="1"/>
+          <p:nvPr/>
+        </p:nvSpPr>
+        <p:spPr>
+          <a:xfrm>
+            <a:off x="10153530" y="1598739"/>
+            <a:ext cx="1666875" cy="369332"/>
+          </a:xfrm>
+          <a:prstGeom prst="rect">
+            <a:avLst/>
+          </a:prstGeom>
+          <a:noFill/>
+        </p:spPr>
+        <p:txBody>
+          <a:bodyPr wrap="square" rtlCol="0">
+            <a:spAutoFit/>
+          </a:bodyPr>
+          <a:lstStyle/>
+          <a:p>
+            <a:r>
+              <a:rPr lang="en-US" dirty="0"/>
+              <a:t>female   male</a:t>
+            </a:r>
+          </a:p>
+        </p:txBody>
+      </p:sp>
+      <p:sp>
+        <p:nvSpPr>
+          <p:cNvPr id="7" name="TextBox 6">
+            <a:extLst>
+              <a:ext uri="{FF2B5EF4-FFF2-40B4-BE49-F238E27FC236}">
+                <a16:creationId xmlns:a16="http://schemas.microsoft.com/office/drawing/2014/main" id="{8B6FF498-5252-294B-5151-967EF916BCAB}"/>
+              </a:ext>
+            </a:extLst>
+          </p:cNvPr>
+          <p:cNvSpPr txBox="1"/>
+          <p:nvPr/>
+        </p:nvSpPr>
+        <p:spPr>
+          <a:xfrm>
+            <a:off x="9520117" y="2014584"/>
+            <a:ext cx="1666875" cy="646331"/>
+          </a:xfrm>
+          <a:prstGeom prst="rect">
+            <a:avLst/>
+          </a:prstGeom>
+          <a:noFill/>
+        </p:spPr>
+        <p:txBody>
+          <a:bodyPr wrap="square" rtlCol="0">
+            <a:spAutoFit/>
+          </a:bodyPr>
+          <a:lstStyle/>
+          <a:p>
+            <a:r>
+              <a:rPr lang="en-US" dirty="0"/>
+              <a:t>female</a:t>
+            </a:r>
+          </a:p>
+          <a:p>
+            <a:r>
+              <a:rPr lang="en-US" dirty="0"/>
+              <a:t>male</a:t>
+            </a:r>
+          </a:p>
+        </p:txBody>
+      </p:sp>
+      <p:sp>
+        <p:nvSpPr>
+          <p:cNvPr id="8" name="TextBox 7">
+            <a:extLst>
+              <a:ext uri="{FF2B5EF4-FFF2-40B4-BE49-F238E27FC236}">
+                <a16:creationId xmlns:a16="http://schemas.microsoft.com/office/drawing/2014/main" id="{9A5FDCE5-C079-9C50-5513-C0F3D7914F0A}"/>
+              </a:ext>
+            </a:extLst>
+          </p:cNvPr>
+          <p:cNvSpPr txBox="1"/>
+          <p:nvPr/>
+        </p:nvSpPr>
+        <p:spPr>
+          <a:xfrm>
+            <a:off x="11437550" y="2014584"/>
+            <a:ext cx="733425" cy="461665"/>
+          </a:xfrm>
+          <a:prstGeom prst="rect">
+            <a:avLst/>
+          </a:prstGeom>
+          <a:noFill/>
+        </p:spPr>
+        <p:txBody>
+          <a:bodyPr wrap="square" rtlCol="0">
+            <a:spAutoFit/>
+          </a:bodyPr>
+          <a:lstStyle/>
+          <a:p>
+            <a:r>
+              <a:rPr lang="en-US" sz="2400" dirty="0"/>
+              <a:t>84%</a:t>
+            </a:r>
+          </a:p>
+        </p:txBody>
+      </p:sp>
+      <p:sp>
+        <p:nvSpPr>
+          <p:cNvPr id="9" name="TextBox 8">
+            <a:extLst>
+              <a:ext uri="{FF2B5EF4-FFF2-40B4-BE49-F238E27FC236}">
+                <a16:creationId xmlns:a16="http://schemas.microsoft.com/office/drawing/2014/main" id="{A127AAE8-1D06-AA21-6438-2110B5EEC3F8}"/>
+              </a:ext>
+            </a:extLst>
+          </p:cNvPr>
+          <p:cNvSpPr txBox="1"/>
+          <p:nvPr/>
+        </p:nvSpPr>
+        <p:spPr>
+          <a:xfrm>
+            <a:off x="11503907" y="4121086"/>
+            <a:ext cx="733425" cy="461665"/>
+          </a:xfrm>
+          <a:prstGeom prst="rect">
+            <a:avLst/>
+          </a:prstGeom>
+          <a:noFill/>
+        </p:spPr>
+        <p:txBody>
+          <a:bodyPr wrap="square" rtlCol="0">
+            <a:spAutoFit/>
+          </a:bodyPr>
+          <a:lstStyle/>
+          <a:p>
+            <a:r>
+              <a:rPr lang="en-US" sz="2400" dirty="0"/>
+              <a:t>16%</a:t>
+            </a:r>
+          </a:p>
+        </p:txBody>
+      </p:sp>
+    </p:spTree>
+    <p:extLst>
+      <p:ext uri="{BB962C8B-B14F-4D97-AF65-F5344CB8AC3E}">
+        <p14:creationId xmlns:p14="http://schemas.microsoft.com/office/powerpoint/2010/main" val="2783141725"/>
+      </p:ext>
+    </p:extLst>
+  </p:cSld>
+  <p:clrMapOvr>
+    <a:masterClrMapping/>
+  </p:clrMapOvr>
+</p:sld>
+</file>
+
+<file path=ppt/slides/slide9.xml><?xml version="1.0" encoding="utf-8"?>
+<p:sld xmlns:a="http://schemas.openxmlformats.org/drawingml/2006/main" xmlns:r="http://schemas.openxmlformats.org/officeDocument/2006/relationships" xmlns:p="http://schemas.openxmlformats.org/presentationml/2006/main">
+  <p:cSld>
+    <p:bg>
+      <p:bgPr>
+        <a:solidFill>
+          <a:schemeClr val="bg1"/>
+        </a:solidFill>
+        <a:effectLst/>
+      </p:bgPr>
+    </p:bg>
+    <p:spTree>
+      <p:nvGrpSpPr>
+        <p:cNvPr id="1" name=""/>
+        <p:cNvGrpSpPr/>
+        <p:nvPr/>
+      </p:nvGrpSpPr>
+      <p:grpSpPr>
+        <a:xfrm>
+          <a:off x="0" y="0"/>
+          <a:ext cx="0" cy="0"/>
+          <a:chOff x="0" y="0"/>
+          <a:chExt cx="0" cy="0"/>
+        </a:xfrm>
+      </p:grpSpPr>
+      <p:graphicFrame>
+        <p:nvGraphicFramePr>
+          <p:cNvPr id="2" name="Table 1">
+            <a:extLst>
+              <a:ext uri="{FF2B5EF4-FFF2-40B4-BE49-F238E27FC236}">
+                <a16:creationId xmlns:a16="http://schemas.microsoft.com/office/drawing/2014/main" id="{12C02E3C-D915-EA28-2E65-B192A7A968FB}"/>
+              </a:ext>
+            </a:extLst>
+          </p:cNvPr>
+          <p:cNvGraphicFramePr>
+            <a:graphicFrameLocks noGrp="1"/>
+          </p:cNvGraphicFramePr>
+          <p:nvPr>
+            <p:extLst>
+              <p:ext uri="{D42A27DB-BD31-4B8C-83A1-F6EECF244321}">
+                <p14:modId xmlns:p14="http://schemas.microsoft.com/office/powerpoint/2010/main" val="2191899900"/>
+              </p:ext>
+            </p:extLst>
+          </p:nvPr>
+        </p:nvGraphicFramePr>
+        <p:xfrm>
+          <a:off x="1817545" y="780809"/>
+          <a:ext cx="5659700" cy="1575009"/>
+        </p:xfrm>
+        <a:graphic>
+          <a:graphicData uri="http://schemas.openxmlformats.org/drawingml/2006/table">
+            <a:tbl>
+              <a:tblPr>
+                <a:tableStyleId>{8EC20E35-A176-4012-BC5E-935CFFF8708E}</a:tableStyleId>
+              </a:tblPr>
+              <a:tblGrid>
+                <a:gridCol w="1131940">
+                  <a:extLst>
+                    <a:ext uri="{9D8B030D-6E8A-4147-A177-3AD203B41FA5}">
+                      <a16:colId xmlns:a16="http://schemas.microsoft.com/office/drawing/2014/main" val="1333247749"/>
+                    </a:ext>
+                  </a:extLst>
+                </a:gridCol>
+                <a:gridCol w="1131940">
+                  <a:extLst>
+                    <a:ext uri="{9D8B030D-6E8A-4147-A177-3AD203B41FA5}">
+                      <a16:colId xmlns:a16="http://schemas.microsoft.com/office/drawing/2014/main" val="2416871148"/>
+                    </a:ext>
+                  </a:extLst>
+                </a:gridCol>
+                <a:gridCol w="1131940">
+                  <a:extLst>
+                    <a:ext uri="{9D8B030D-6E8A-4147-A177-3AD203B41FA5}">
+                      <a16:colId xmlns:a16="http://schemas.microsoft.com/office/drawing/2014/main" val="2216203054"/>
+                    </a:ext>
+                  </a:extLst>
+                </a:gridCol>
+                <a:gridCol w="1131940">
+                  <a:extLst>
+                    <a:ext uri="{9D8B030D-6E8A-4147-A177-3AD203B41FA5}">
+                      <a16:colId xmlns:a16="http://schemas.microsoft.com/office/drawing/2014/main" val="1550318976"/>
+                    </a:ext>
+                  </a:extLst>
+                </a:gridCol>
+                <a:gridCol w="1131940">
+                  <a:extLst>
+                    <a:ext uri="{9D8B030D-6E8A-4147-A177-3AD203B41FA5}">
+                      <a16:colId xmlns:a16="http://schemas.microsoft.com/office/drawing/2014/main" val="1912815238"/>
+                    </a:ext>
+                  </a:extLst>
+                </a:gridCol>
+              </a:tblGrid>
+              <a:tr h="326521">
+                <a:tc>
+                  <a:txBody>
+                    <a:bodyPr/>
+                    <a:lstStyle/>
+                    <a:p>
+                      <a:pPr algn="l" fontAlgn="b"/>
+                      <a:endParaRPr lang="en-US" sz="1900" b="0" i="0" u="none" strike="noStrike" dirty="0">
+                        <a:solidFill>
+                          <a:srgbClr val="000000"/>
+                        </a:solidFill>
+                        <a:effectLst/>
+                        <a:latin typeface="Calibri" panose="020F0502020204030204" pitchFamily="34" charset="0"/>
+                      </a:endParaRPr>
+                    </a:p>
+                  </a:txBody>
+                  <a:tcPr marL="16326" marR="16326" marT="16326" marB="0" anchor="b">
+                    <a:lnL>
+                      <a:noFill/>
+                    </a:lnL>
+                    <a:lnR>
+                      <a:noFill/>
+                    </a:lnR>
+                    <a:lnT w="25400" cmpd="sng">
+                      <a:noFill/>
+                    </a:lnT>
+                    <a:lnB>
+                      <a:noFill/>
+                    </a:lnB>
+                    <a:lnTlToBr w="12700" cmpd="sng">
+                      <a:noFill/>
+                      <a:prstDash val="solid"/>
+                    </a:lnTlToBr>
+                    <a:lnBlToTr w="12700" cmpd="sng">
+                      <a:noFill/>
+                      <a:prstDash val="solid"/>
+                    </a:lnBlToTr>
+                  </a:tcPr>
+                </a:tc>
+                <a:tc>
+                  <a:txBody>
+                    <a:bodyPr/>
+                    <a:lstStyle/>
+                    <a:p>
+                      <a:pPr algn="l" fontAlgn="b"/>
+                      <a:r>
+                        <a:rPr lang="en-US" sz="1900" b="1" u="none" strike="noStrike" dirty="0">
+                          <a:effectLst/>
+                        </a:rPr>
+                        <a:t>HEIGHT</a:t>
+                      </a:r>
+                      <a:endParaRPr lang="en-US" sz="1900" b="1" i="0" u="none" strike="noStrike" dirty="0">
+                        <a:solidFill>
+                          <a:srgbClr val="000000"/>
+                        </a:solidFill>
+                        <a:effectLst/>
+                        <a:latin typeface="Calibri" panose="020F0502020204030204" pitchFamily="34" charset="0"/>
+                      </a:endParaRPr>
+                    </a:p>
+                  </a:txBody>
+                  <a:tcPr marL="16326" marR="16326" marT="16326" marB="0" anchor="b">
+                    <a:lnL>
+                      <a:noFill/>
+                    </a:lnL>
+                    <a:lnR>
+                      <a:noFill/>
+                    </a:lnR>
+                    <a:lnT w="25400" cmpd="sng">
+                      <a:noFill/>
+                    </a:lnT>
+                    <a:lnB>
+                      <a:noFill/>
+                    </a:lnB>
+                    <a:lnTlToBr w="12700" cmpd="sng">
+                      <a:noFill/>
+                      <a:prstDash val="solid"/>
+                    </a:lnTlToBr>
+                    <a:lnBlToTr w="12700" cmpd="sng">
+                      <a:noFill/>
+                      <a:prstDash val="solid"/>
+                    </a:lnBlToTr>
+                  </a:tcPr>
+                </a:tc>
+                <a:tc>
+                  <a:txBody>
+                    <a:bodyPr/>
+                    <a:lstStyle/>
+                    <a:p>
+                      <a:pPr algn="l" fontAlgn="b"/>
+                      <a:endParaRPr lang="en-US" sz="1900" b="0" i="0" u="none" strike="noStrike" dirty="0">
+                        <a:solidFill>
+                          <a:srgbClr val="000000"/>
+                        </a:solidFill>
+                        <a:effectLst/>
+                        <a:latin typeface="Calibri" panose="020F0502020204030204" pitchFamily="34" charset="0"/>
+                      </a:endParaRPr>
+                    </a:p>
+                  </a:txBody>
+                  <a:tcPr marL="16326" marR="16326" marT="16326" marB="0" anchor="b">
+                    <a:lnL>
+                      <a:noFill/>
+                    </a:lnL>
+                    <a:lnR>
+                      <a:noFill/>
+                    </a:lnR>
+                    <a:lnT w="25400" cmpd="sng">
+                      <a:noFill/>
+                    </a:lnT>
+                    <a:lnB>
+                      <a:noFill/>
+                    </a:lnB>
+                    <a:lnTlToBr w="12700" cmpd="sng">
+                      <a:noFill/>
+                      <a:prstDash val="solid"/>
+                    </a:lnTlToBr>
+                    <a:lnBlToTr w="12700" cmpd="sng">
+                      <a:noFill/>
+                      <a:prstDash val="solid"/>
+                    </a:lnBlToTr>
+                  </a:tcPr>
+                </a:tc>
+                <a:tc>
+                  <a:txBody>
+                    <a:bodyPr/>
+                    <a:lstStyle/>
+                    <a:p>
+                      <a:pPr algn="l" fontAlgn="b"/>
+                      <a:endParaRPr lang="en-US" sz="1900" b="0" i="0" u="none" strike="noStrike" dirty="0">
+                        <a:solidFill>
+                          <a:srgbClr val="000000"/>
+                        </a:solidFill>
+                        <a:effectLst/>
+                        <a:latin typeface="Calibri" panose="020F0502020204030204" pitchFamily="34" charset="0"/>
+                      </a:endParaRPr>
+                    </a:p>
+                  </a:txBody>
+                  <a:tcPr marL="16326" marR="16326" marT="16326" marB="0" anchor="b">
+                    <a:lnL>
+                      <a:noFill/>
+                    </a:lnL>
+                    <a:lnR>
+                      <a:noFill/>
+                    </a:lnR>
+                    <a:lnT w="25400" cmpd="sng">
+                      <a:noFill/>
+                    </a:lnT>
+                    <a:lnB>
+                      <a:noFill/>
+                    </a:lnB>
+                    <a:lnTlToBr w="12700" cmpd="sng">
+                      <a:noFill/>
+                      <a:prstDash val="solid"/>
+                    </a:lnTlToBr>
+                    <a:lnBlToTr w="12700" cmpd="sng">
+                      <a:noFill/>
+                      <a:prstDash val="solid"/>
+                    </a:lnBlToTr>
+                  </a:tcPr>
+                </a:tc>
+                <a:tc>
+                  <a:txBody>
+                    <a:bodyPr/>
+                    <a:lstStyle/>
+                    <a:p>
+                      <a:pPr algn="l" fontAlgn="b"/>
+                      <a:endParaRPr lang="en-US" sz="1900" b="0" i="0" u="none" strike="noStrike" dirty="0">
+                        <a:solidFill>
+                          <a:srgbClr val="000000"/>
+                        </a:solidFill>
+                        <a:effectLst/>
+                        <a:latin typeface="Calibri" panose="020F0502020204030204" pitchFamily="34" charset="0"/>
+                      </a:endParaRPr>
+                    </a:p>
+                  </a:txBody>
+                  <a:tcPr marL="16326" marR="16326" marT="16326" marB="0" anchor="b">
+                    <a:lnL>
+                      <a:noFill/>
+                    </a:lnL>
+                    <a:lnR>
+                      <a:noFill/>
+                    </a:lnR>
+                    <a:lnT w="25400" cmpd="sng">
+                      <a:noFill/>
+                    </a:lnT>
+                    <a:lnB>
+                      <a:noFill/>
+                    </a:lnB>
+                    <a:lnTlToBr w="12700" cmpd="sng">
+                      <a:noFill/>
+                      <a:prstDash val="solid"/>
+                    </a:lnTlToBr>
+                    <a:lnBlToTr w="12700" cmpd="sng">
+                      <a:noFill/>
+                      <a:prstDash val="solid"/>
+                    </a:lnBlToTr>
+                  </a:tcPr>
+                </a:tc>
+                <a:extLst>
+                  <a:ext uri="{0D108BD9-81ED-4DB2-BD59-A6C34878D82A}">
+                    <a16:rowId xmlns:a16="http://schemas.microsoft.com/office/drawing/2014/main" val="2109277221"/>
+                  </a:ext>
+                </a:extLst>
+              </a:tr>
+              <a:tr h="594936">
+                <a:tc>
+                  <a:txBody>
+                    <a:bodyPr/>
+                    <a:lstStyle/>
+                    <a:p>
+                      <a:pPr algn="l" fontAlgn="b"/>
+                      <a:endParaRPr lang="en-US" sz="1900" b="0" i="0" u="none" strike="noStrike" dirty="0">
+                        <a:solidFill>
+                          <a:srgbClr val="000000"/>
+                        </a:solidFill>
+                        <a:effectLst/>
+                        <a:latin typeface="Calibri" panose="020F0502020204030204" pitchFamily="34" charset="0"/>
+                      </a:endParaRPr>
+                    </a:p>
+                  </a:txBody>
+                  <a:tcPr marL="16326" marR="16326" marT="16326" marB="0" anchor="b">
+                    <a:lnT>
+                      <a:noFill/>
+                    </a:lnT>
+                    <a:lnB w="12700" cap="flat" cmpd="sng" algn="ctr">
+                      <a:solidFill>
+                        <a:schemeClr val="tx1"/>
+                      </a:solidFill>
+                      <a:prstDash val="solid"/>
+                      <a:round/>
+                      <a:headEnd type="none" w="med" len="med"/>
+                      <a:tailEnd type="none" w="med" len="med"/>
+                    </a:lnB>
+                  </a:tcPr>
+                </a:tc>
+                <a:tc>
+                  <a:txBody>
+                    <a:bodyPr/>
+                    <a:lstStyle/>
+                    <a:p>
+                      <a:pPr algn="l" fontAlgn="b"/>
+                      <a:r>
+                        <a:rPr lang="en-US" sz="1900" u="none" strike="noStrike" dirty="0">
+                          <a:effectLst/>
+                        </a:rPr>
+                        <a:t># sex het SNPs</a:t>
+                      </a:r>
+                      <a:endParaRPr lang="en-US" sz="1900" b="0" i="0" u="none" strike="noStrike" dirty="0">
+                        <a:solidFill>
+                          <a:srgbClr val="000000"/>
+                        </a:solidFill>
+                        <a:effectLst/>
+                        <a:latin typeface="Calibri" panose="020F0502020204030204" pitchFamily="34" charset="0"/>
+                      </a:endParaRPr>
+                    </a:p>
+                  </a:txBody>
+                  <a:tcPr marL="16326" marR="16326" marT="16326" marB="0" anchor="b">
+                    <a:lnT>
+                      <a:noFill/>
+                    </a:lnT>
+                    <a:lnB w="12700" cap="flat" cmpd="sng" algn="ctr">
+                      <a:solidFill>
+                        <a:schemeClr val="tx1"/>
+                      </a:solidFill>
+                      <a:prstDash val="solid"/>
+                      <a:round/>
+                      <a:headEnd type="none" w="med" len="med"/>
+                      <a:tailEnd type="none" w="med" len="med"/>
+                    </a:lnB>
+                  </a:tcPr>
+                </a:tc>
+                <a:tc>
+                  <a:txBody>
+                    <a:bodyPr/>
+                    <a:lstStyle/>
+                    <a:p>
+                      <a:pPr algn="l" fontAlgn="b"/>
+                      <a:r>
+                        <a:rPr lang="en-US" sz="1900" u="none" strike="noStrike" dirty="0">
+                          <a:effectLst/>
+                        </a:rPr>
+                        <a:t>% effect in one sex</a:t>
+                      </a:r>
+                      <a:endParaRPr lang="en-US" sz="1900" b="0" i="0" u="none" strike="noStrike" dirty="0">
+                        <a:solidFill>
+                          <a:srgbClr val="000000"/>
+                        </a:solidFill>
+                        <a:effectLst/>
+                        <a:latin typeface="Calibri" panose="020F0502020204030204" pitchFamily="34" charset="0"/>
+                      </a:endParaRPr>
+                    </a:p>
+                  </a:txBody>
+                  <a:tcPr marL="16326" marR="16326" marT="16326" marB="0" anchor="b">
+                    <a:lnT>
+                      <a:noFill/>
+                    </a:lnT>
+                    <a:lnB w="12700" cap="flat" cmpd="sng" algn="ctr">
+                      <a:solidFill>
+                        <a:schemeClr val="tx1"/>
+                      </a:solidFill>
+                      <a:prstDash val="solid"/>
+                      <a:round/>
+                      <a:headEnd type="none" w="med" len="med"/>
+                      <a:tailEnd type="none" w="med" len="med"/>
+                    </a:lnB>
+                  </a:tcPr>
+                </a:tc>
+                <a:tc>
+                  <a:txBody>
+                    <a:bodyPr/>
+                    <a:lstStyle/>
+                    <a:p>
+                      <a:pPr algn="l" fontAlgn="b"/>
+                      <a:r>
+                        <a:rPr lang="en-US" sz="1900" u="none" strike="noStrike" dirty="0">
+                          <a:effectLst/>
+                        </a:rPr>
+                        <a:t>% opposite direction</a:t>
+                      </a:r>
+                      <a:endParaRPr lang="en-US" sz="1900" b="0" i="0" u="none" strike="noStrike" dirty="0">
+                        <a:solidFill>
+                          <a:srgbClr val="000000"/>
+                        </a:solidFill>
+                        <a:effectLst/>
+                        <a:latin typeface="Calibri" panose="020F0502020204030204" pitchFamily="34" charset="0"/>
+                      </a:endParaRPr>
+                    </a:p>
+                  </a:txBody>
+                  <a:tcPr marL="16326" marR="16326" marT="16326" marB="0" anchor="b">
+                    <a:lnT>
+                      <a:noFill/>
+                    </a:lnT>
+                    <a:lnB w="12700" cap="flat" cmpd="sng" algn="ctr">
+                      <a:solidFill>
+                        <a:schemeClr val="tx1"/>
+                      </a:solidFill>
+                      <a:prstDash val="solid"/>
+                      <a:round/>
+                      <a:headEnd type="none" w="med" len="med"/>
+                      <a:tailEnd type="none" w="med" len="med"/>
+                    </a:lnB>
+                  </a:tcPr>
+                </a:tc>
+                <a:tc>
+                  <a:txBody>
+                    <a:bodyPr/>
+                    <a:lstStyle/>
+                    <a:p>
+                      <a:pPr algn="l" fontAlgn="b"/>
+                      <a:r>
+                        <a:rPr lang="en-US" sz="1900" u="none" strike="noStrike" dirty="0">
+                          <a:effectLst/>
+                        </a:rPr>
+                        <a:t>% same direction</a:t>
+                      </a:r>
+                      <a:endParaRPr lang="en-US" sz="1900" b="0" i="0" u="none" strike="noStrike" dirty="0">
+                        <a:solidFill>
+                          <a:srgbClr val="000000"/>
+                        </a:solidFill>
+                        <a:effectLst/>
+                        <a:latin typeface="Calibri" panose="020F0502020204030204" pitchFamily="34" charset="0"/>
+                      </a:endParaRPr>
+                    </a:p>
+                  </a:txBody>
+                  <a:tcPr marL="16326" marR="16326" marT="16326" marB="0" anchor="b">
+                    <a:lnT>
+                      <a:noFill/>
+                    </a:lnT>
+                    <a:lnB w="12700" cap="flat" cmpd="sng" algn="ctr">
+                      <a:solidFill>
+                        <a:schemeClr val="tx1"/>
+                      </a:solidFill>
+                      <a:prstDash val="solid"/>
+                      <a:round/>
+                      <a:headEnd type="none" w="med" len="med"/>
+                      <a:tailEnd type="none" w="med" len="med"/>
+                    </a:lnB>
+                  </a:tcPr>
+                </a:tc>
+                <a:extLst>
+                  <a:ext uri="{0D108BD9-81ED-4DB2-BD59-A6C34878D82A}">
+                    <a16:rowId xmlns:a16="http://schemas.microsoft.com/office/drawing/2014/main" val="1926449536"/>
+                  </a:ext>
+                </a:extLst>
+              </a:tr>
+              <a:tr h="326521">
+                <a:tc>
+                  <a:txBody>
+                    <a:bodyPr/>
+                    <a:lstStyle/>
+                    <a:p>
+                      <a:pPr algn="r" fontAlgn="b"/>
+                      <a:r>
+                        <a:rPr lang="en-US" sz="1900" b="0" i="0" u="none" strike="noStrike" dirty="0">
+                          <a:solidFill>
+                            <a:srgbClr val="000000"/>
+                          </a:solidFill>
+                          <a:effectLst/>
+                          <a:latin typeface="Calibri" panose="020F0502020204030204" pitchFamily="34" charset="0"/>
+                        </a:rPr>
+                        <a:t>Mean</a:t>
+                      </a:r>
+                    </a:p>
+                  </a:txBody>
+                  <a:tcPr marL="16326" marR="16326" marT="16326" marB="0" anchor="b">
+                    <a:lnR w="12700" cap="flat" cmpd="sng" algn="ctr">
+                      <a:solidFill>
+                        <a:schemeClr val="tx1"/>
+                      </a:solidFill>
+                      <a:prstDash val="solid"/>
+                      <a:round/>
+                      <a:headEnd type="none" w="med" len="med"/>
+                      <a:tailEnd type="none" w="med" len="med"/>
+                    </a:lnR>
+                    <a:lnT w="12700" cap="flat" cmpd="sng" algn="ctr">
+                      <a:solidFill>
+                        <a:schemeClr val="tx1"/>
+                      </a:solidFill>
+                      <a:prstDash val="solid"/>
+                      <a:round/>
+                      <a:headEnd type="none" w="med" len="med"/>
+                      <a:tailEnd type="none" w="med" len="med"/>
+                    </a:lnT>
+                  </a:tcPr>
+                </a:tc>
+                <a:tc>
+                  <a:txBody>
+                    <a:bodyPr/>
+                    <a:lstStyle/>
+                    <a:p>
+                      <a:pPr algn="r" fontAlgn="b"/>
+                      <a:r>
+                        <a:rPr lang="en-US" sz="1900" u="none" strike="noStrike">
+                          <a:effectLst/>
+                        </a:rPr>
+                        <a:t>208.8</a:t>
+                      </a:r>
+                      <a:endParaRPr lang="en-US" sz="1900" b="0" i="0" u="none" strike="noStrike">
+                        <a:solidFill>
+                          <a:srgbClr val="000000"/>
+                        </a:solidFill>
+                        <a:effectLst/>
+                        <a:latin typeface="Calibri" panose="020F0502020204030204" pitchFamily="34" charset="0"/>
+                      </a:endParaRPr>
+                    </a:p>
+                  </a:txBody>
+                  <a:tcPr marL="16326" marR="16326" marT="16326" marB="0" anchor="b">
+                    <a:lnL w="12700" cap="flat" cmpd="sng" algn="ctr">
+                      <a:solidFill>
+                        <a:schemeClr val="tx1"/>
+                      </a:solidFill>
+                      <a:prstDash val="solid"/>
+                      <a:round/>
+                      <a:headEnd type="none" w="med" len="med"/>
+                      <a:tailEnd type="none" w="med" len="med"/>
+                    </a:lnL>
+                    <a:lnT w="12700" cap="flat" cmpd="sng" algn="ctr">
+                      <a:solidFill>
+                        <a:schemeClr val="tx1"/>
+                      </a:solidFill>
+                      <a:prstDash val="solid"/>
+                      <a:round/>
+                      <a:headEnd type="none" w="med" len="med"/>
+                      <a:tailEnd type="none" w="med" len="med"/>
+                    </a:lnT>
+                  </a:tcPr>
+                </a:tc>
+                <a:tc>
+                  <a:txBody>
+                    <a:bodyPr/>
+                    <a:lstStyle/>
+                    <a:p>
+                      <a:pPr algn="r" fontAlgn="b"/>
+                      <a:r>
+                        <a:rPr lang="en-US" sz="1900" u="none" strike="noStrike">
+                          <a:effectLst/>
+                        </a:rPr>
+                        <a:t>37.6%</a:t>
+                      </a:r>
+                      <a:endParaRPr lang="en-US" sz="1900" b="0" i="0" u="none" strike="noStrike">
+                        <a:solidFill>
+                          <a:srgbClr val="000000"/>
+                        </a:solidFill>
+                        <a:effectLst/>
+                        <a:latin typeface="Calibri" panose="020F0502020204030204" pitchFamily="34" charset="0"/>
+                      </a:endParaRPr>
+                    </a:p>
+                  </a:txBody>
+                  <a:tcPr marL="16326" marR="16326" marT="16326" marB="0" anchor="b">
+                    <a:lnT w="12700" cap="flat" cmpd="sng" algn="ctr">
+                      <a:solidFill>
+                        <a:schemeClr val="tx1"/>
+                      </a:solidFill>
+                      <a:prstDash val="solid"/>
+                      <a:round/>
+                      <a:headEnd type="none" w="med" len="med"/>
+                      <a:tailEnd type="none" w="med" len="med"/>
+                    </a:lnT>
+                  </a:tcPr>
+                </a:tc>
+                <a:tc>
+                  <a:txBody>
+                    <a:bodyPr/>
+                    <a:lstStyle/>
+                    <a:p>
+                      <a:pPr algn="r" fontAlgn="b"/>
+                      <a:r>
+                        <a:rPr lang="en-US" sz="1900" u="none" strike="noStrike">
+                          <a:effectLst/>
+                        </a:rPr>
+                        <a:t>12.5%</a:t>
+                      </a:r>
+                      <a:endParaRPr lang="en-US" sz="1900" b="0" i="0" u="none" strike="noStrike">
+                        <a:solidFill>
+                          <a:srgbClr val="000000"/>
+                        </a:solidFill>
+                        <a:effectLst/>
+                        <a:latin typeface="Calibri" panose="020F0502020204030204" pitchFamily="34" charset="0"/>
+                      </a:endParaRPr>
+                    </a:p>
+                  </a:txBody>
+                  <a:tcPr marL="16326" marR="16326" marT="16326" marB="0" anchor="b">
+                    <a:lnT w="12700" cap="flat" cmpd="sng" algn="ctr">
+                      <a:solidFill>
+                        <a:schemeClr val="tx1"/>
+                      </a:solidFill>
+                      <a:prstDash val="solid"/>
+                      <a:round/>
+                      <a:headEnd type="none" w="med" len="med"/>
+                      <a:tailEnd type="none" w="med" len="med"/>
+                    </a:lnT>
+                  </a:tcPr>
+                </a:tc>
+                <a:tc>
+                  <a:txBody>
+                    <a:bodyPr/>
+                    <a:lstStyle/>
+                    <a:p>
+                      <a:pPr algn="r" fontAlgn="b"/>
+                      <a:r>
+                        <a:rPr lang="en-US" sz="1900" u="none" strike="noStrike" dirty="0">
+                          <a:effectLst/>
+                        </a:rPr>
+                        <a:t>49.9%</a:t>
+                      </a:r>
+                      <a:endParaRPr lang="en-US" sz="1900" b="0" i="0" u="none" strike="noStrike" dirty="0">
+                        <a:solidFill>
+                          <a:srgbClr val="000000"/>
+                        </a:solidFill>
+                        <a:effectLst/>
+                        <a:latin typeface="Calibri" panose="020F0502020204030204" pitchFamily="34" charset="0"/>
+                      </a:endParaRPr>
+                    </a:p>
+                  </a:txBody>
+                  <a:tcPr marL="16326" marR="16326" marT="16326" marB="0" anchor="b">
+                    <a:lnT w="12700" cap="flat" cmpd="sng" algn="ctr">
+                      <a:solidFill>
+                        <a:schemeClr val="tx1"/>
+                      </a:solidFill>
+                      <a:prstDash val="solid"/>
+                      <a:round/>
+                      <a:headEnd type="none" w="med" len="med"/>
+                      <a:tailEnd type="none" w="med" len="med"/>
+                    </a:lnT>
+                  </a:tcPr>
+                </a:tc>
+                <a:extLst>
+                  <a:ext uri="{0D108BD9-81ED-4DB2-BD59-A6C34878D82A}">
+                    <a16:rowId xmlns:a16="http://schemas.microsoft.com/office/drawing/2014/main" val="1513768025"/>
+                  </a:ext>
+                </a:extLst>
+              </a:tr>
+              <a:tr h="326521">
+                <a:tc>
+                  <a:txBody>
+                    <a:bodyPr/>
+                    <a:lstStyle/>
+                    <a:p>
+                      <a:pPr algn="r" fontAlgn="b"/>
+                      <a:r>
+                        <a:rPr lang="en-US" sz="1900" b="0" i="0" u="none" strike="noStrike" dirty="0">
+                          <a:solidFill>
+                            <a:srgbClr val="000000"/>
+                          </a:solidFill>
+                          <a:effectLst/>
+                          <a:latin typeface="Calibri" panose="020F0502020204030204" pitchFamily="34" charset="0"/>
+                        </a:rPr>
+                        <a:t>SE</a:t>
+                      </a:r>
+                    </a:p>
+                  </a:txBody>
+                  <a:tcPr marL="16326" marR="16326" marT="16326" marB="0" anchor="b">
+                    <a:lnR w="12700" cap="flat" cmpd="sng" algn="ctr">
+                      <a:solidFill>
+                        <a:schemeClr val="tx1"/>
+                      </a:solidFill>
+                      <a:prstDash val="solid"/>
+                      <a:round/>
+                      <a:headEnd type="none" w="med" len="med"/>
+                      <a:tailEnd type="none" w="med" len="med"/>
+                    </a:lnR>
+                    <a:lnB w="12700" cap="flat" cmpd="sng" algn="ctr">
+                      <a:noFill/>
+                      <a:prstDash val="solid"/>
+                      <a:round/>
+                      <a:headEnd type="none" w="med" len="med"/>
+                      <a:tailEnd type="none" w="med" len="med"/>
+                    </a:lnB>
+                  </a:tcPr>
+                </a:tc>
+                <a:tc>
+                  <a:txBody>
+                    <a:bodyPr/>
+                    <a:lstStyle/>
+                    <a:p>
+                      <a:pPr algn="r" fontAlgn="b"/>
+                      <a:r>
+                        <a:rPr lang="en-US" sz="1900" u="none" strike="noStrike" dirty="0">
+                          <a:effectLst/>
+                        </a:rPr>
+                        <a:t>4.50</a:t>
+                      </a:r>
+                      <a:endParaRPr lang="en-US" sz="1900" b="0" i="0" u="none" strike="noStrike" dirty="0">
+                        <a:solidFill>
+                          <a:srgbClr val="000000"/>
+                        </a:solidFill>
+                        <a:effectLst/>
+                        <a:latin typeface="Calibri" panose="020F0502020204030204" pitchFamily="34" charset="0"/>
+                      </a:endParaRPr>
+                    </a:p>
+                  </a:txBody>
+                  <a:tcPr marL="16326" marR="16326" marT="16326" marB="0" anchor="b">
+                    <a:lnL w="12700" cap="flat" cmpd="sng" algn="ctr">
+                      <a:solidFill>
+                        <a:schemeClr val="tx1"/>
+                      </a:solidFill>
+                      <a:prstDash val="solid"/>
+                      <a:round/>
+                      <a:headEnd type="none" w="med" len="med"/>
+                      <a:tailEnd type="none" w="med" len="med"/>
+                    </a:lnL>
+                    <a:lnB w="12700" cap="flat" cmpd="sng" algn="ctr">
+                      <a:noFill/>
+                      <a:prstDash val="solid"/>
+                      <a:round/>
+                      <a:headEnd type="none" w="med" len="med"/>
+                      <a:tailEnd type="none" w="med" len="med"/>
+                    </a:lnB>
+                  </a:tcPr>
+                </a:tc>
+                <a:tc>
+                  <a:txBody>
+                    <a:bodyPr/>
+                    <a:lstStyle/>
+                    <a:p>
+                      <a:pPr algn="r" fontAlgn="b"/>
+                      <a:r>
+                        <a:rPr lang="en-US" sz="1900" u="none" strike="noStrike" dirty="0">
+                          <a:effectLst/>
+                        </a:rPr>
+                        <a:t>0.9%</a:t>
+                      </a:r>
+                      <a:endParaRPr lang="en-US" sz="1900" b="0" i="0" u="none" strike="noStrike" dirty="0">
+                        <a:solidFill>
+                          <a:srgbClr val="000000"/>
+                        </a:solidFill>
+                        <a:effectLst/>
+                        <a:latin typeface="Calibri" panose="020F0502020204030204" pitchFamily="34" charset="0"/>
+                      </a:endParaRPr>
+                    </a:p>
+                  </a:txBody>
+                  <a:tcPr marL="16326" marR="16326" marT="16326" marB="0" anchor="b">
+                    <a:lnB w="12700" cap="flat" cmpd="sng" algn="ctr">
+                      <a:noFill/>
+                      <a:prstDash val="solid"/>
+                      <a:round/>
+                      <a:headEnd type="none" w="med" len="med"/>
+                      <a:tailEnd type="none" w="med" len="med"/>
+                    </a:lnB>
+                  </a:tcPr>
+                </a:tc>
+                <a:tc>
+                  <a:txBody>
+                    <a:bodyPr/>
+                    <a:lstStyle/>
+                    <a:p>
+                      <a:pPr algn="r" fontAlgn="b"/>
+                      <a:r>
+                        <a:rPr lang="en-US" sz="1900" u="none" strike="noStrike" dirty="0">
+                          <a:effectLst/>
+                        </a:rPr>
+                        <a:t>0.9%</a:t>
+                      </a:r>
+                      <a:endParaRPr lang="en-US" sz="1900" b="0" i="0" u="none" strike="noStrike" dirty="0">
+                        <a:solidFill>
+                          <a:srgbClr val="000000"/>
+                        </a:solidFill>
+                        <a:effectLst/>
+                        <a:latin typeface="Calibri" panose="020F0502020204030204" pitchFamily="34" charset="0"/>
+                      </a:endParaRPr>
+                    </a:p>
+                  </a:txBody>
+                  <a:tcPr marL="16326" marR="16326" marT="16326" marB="0" anchor="b">
+                    <a:lnB w="12700" cap="flat" cmpd="sng" algn="ctr">
+                      <a:noFill/>
+                      <a:prstDash val="solid"/>
+                      <a:round/>
+                      <a:headEnd type="none" w="med" len="med"/>
+                      <a:tailEnd type="none" w="med" len="med"/>
+                    </a:lnB>
+                  </a:tcPr>
+                </a:tc>
+                <a:tc>
+                  <a:txBody>
+                    <a:bodyPr/>
+                    <a:lstStyle/>
+                    <a:p>
+                      <a:pPr algn="r" fontAlgn="b"/>
+                      <a:r>
+                        <a:rPr lang="en-US" sz="1900" u="none" strike="noStrike" dirty="0">
+                          <a:effectLst/>
+                        </a:rPr>
+                        <a:t>1.5%</a:t>
+                      </a:r>
+                      <a:endParaRPr lang="en-US" sz="1900" b="0" i="0" u="none" strike="noStrike" dirty="0">
+                        <a:solidFill>
+                          <a:srgbClr val="000000"/>
+                        </a:solidFill>
+                        <a:effectLst/>
+                        <a:latin typeface="Calibri" panose="020F0502020204030204" pitchFamily="34" charset="0"/>
+                      </a:endParaRPr>
+                    </a:p>
+                  </a:txBody>
+                  <a:tcPr marL="16326" marR="16326" marT="16326" marB="0" anchor="b">
+                    <a:lnB w="12700" cap="flat" cmpd="sng" algn="ctr">
+                      <a:noFill/>
+                      <a:prstDash val="solid"/>
+                      <a:round/>
+                      <a:headEnd type="none" w="med" len="med"/>
+                      <a:tailEnd type="none" w="med" len="med"/>
+                    </a:lnB>
+                  </a:tcPr>
+                </a:tc>
+                <a:extLst>
+                  <a:ext uri="{0D108BD9-81ED-4DB2-BD59-A6C34878D82A}">
+                    <a16:rowId xmlns:a16="http://schemas.microsoft.com/office/drawing/2014/main" val="542593200"/>
+                  </a:ext>
+                </a:extLst>
+              </a:tr>
+            </a:tbl>
+          </a:graphicData>
+        </a:graphic>
+      </p:graphicFrame>
+      <p:graphicFrame>
+        <p:nvGraphicFramePr>
+          <p:cNvPr id="3" name="Table 2">
+            <a:extLst>
+              <a:ext uri="{FF2B5EF4-FFF2-40B4-BE49-F238E27FC236}">
+                <a16:creationId xmlns:a16="http://schemas.microsoft.com/office/drawing/2014/main" id="{D8B12A07-9C6D-32AD-61A8-CD55EE06E64D}"/>
+              </a:ext>
+            </a:extLst>
+          </p:cNvPr>
+          <p:cNvGraphicFramePr>
+            <a:graphicFrameLocks noGrp="1"/>
+          </p:cNvGraphicFramePr>
+          <p:nvPr>
+            <p:extLst>
+              <p:ext uri="{D42A27DB-BD31-4B8C-83A1-F6EECF244321}">
+                <p14:modId xmlns:p14="http://schemas.microsoft.com/office/powerpoint/2010/main" val="275532381"/>
+              </p:ext>
+            </p:extLst>
+          </p:nvPr>
+        </p:nvGraphicFramePr>
+        <p:xfrm>
+          <a:off x="1817545" y="2924248"/>
+          <a:ext cx="5659700" cy="1575009"/>
+        </p:xfrm>
+        <a:graphic>
+          <a:graphicData uri="http://schemas.openxmlformats.org/drawingml/2006/table">
+            <a:tbl>
+              <a:tblPr>
+                <a:tableStyleId>{8EC20E35-A176-4012-BC5E-935CFFF8708E}</a:tableStyleId>
+              </a:tblPr>
+              <a:tblGrid>
+                <a:gridCol w="1131940">
+                  <a:extLst>
+                    <a:ext uri="{9D8B030D-6E8A-4147-A177-3AD203B41FA5}">
+                      <a16:colId xmlns:a16="http://schemas.microsoft.com/office/drawing/2014/main" val="281826631"/>
+                    </a:ext>
+                  </a:extLst>
+                </a:gridCol>
+                <a:gridCol w="1131940">
+                  <a:extLst>
+                    <a:ext uri="{9D8B030D-6E8A-4147-A177-3AD203B41FA5}">
+                      <a16:colId xmlns:a16="http://schemas.microsoft.com/office/drawing/2014/main" val="825604933"/>
+                    </a:ext>
+                  </a:extLst>
+                </a:gridCol>
+                <a:gridCol w="1131940">
+                  <a:extLst>
+                    <a:ext uri="{9D8B030D-6E8A-4147-A177-3AD203B41FA5}">
+                      <a16:colId xmlns:a16="http://schemas.microsoft.com/office/drawing/2014/main" val="1734188518"/>
+                    </a:ext>
+                  </a:extLst>
+                </a:gridCol>
+                <a:gridCol w="1131940">
+                  <a:extLst>
+                    <a:ext uri="{9D8B030D-6E8A-4147-A177-3AD203B41FA5}">
+                      <a16:colId xmlns:a16="http://schemas.microsoft.com/office/drawing/2014/main" val="1553910706"/>
+                    </a:ext>
+                  </a:extLst>
+                </a:gridCol>
+                <a:gridCol w="1131940">
+                  <a:extLst>
+                    <a:ext uri="{9D8B030D-6E8A-4147-A177-3AD203B41FA5}">
+                      <a16:colId xmlns:a16="http://schemas.microsoft.com/office/drawing/2014/main" val="1911469602"/>
+                    </a:ext>
+                  </a:extLst>
+                </a:gridCol>
+              </a:tblGrid>
+              <a:tr h="326521">
+                <a:tc>
+                  <a:txBody>
+                    <a:bodyPr/>
+                    <a:lstStyle/>
+                    <a:p>
+                      <a:pPr algn="l" fontAlgn="b"/>
+                      <a:endParaRPr lang="en-US" sz="1900" b="0" i="0" u="none" strike="noStrike" dirty="0">
+                        <a:solidFill>
+                          <a:srgbClr val="000000"/>
+                        </a:solidFill>
+                        <a:effectLst/>
+                        <a:latin typeface="Calibri" panose="020F0502020204030204" pitchFamily="34" charset="0"/>
+                      </a:endParaRPr>
+                    </a:p>
+                  </a:txBody>
+                  <a:tcPr marL="16326" marR="16326" marT="16326" marB="0" anchor="b">
+                    <a:lnL>
+                      <a:noFill/>
+                    </a:lnL>
+                    <a:lnR>
+                      <a:noFill/>
+                    </a:lnR>
+                    <a:lnT w="25400" cmpd="sng">
+                      <a:noFill/>
+                    </a:lnT>
+                    <a:lnB>
+                      <a:noFill/>
+                    </a:lnB>
+                    <a:lnTlToBr w="12700" cmpd="sng">
+                      <a:noFill/>
+                      <a:prstDash val="solid"/>
+                    </a:lnTlToBr>
+                    <a:lnBlToTr w="12700" cmpd="sng">
+                      <a:noFill/>
+                      <a:prstDash val="solid"/>
+                    </a:lnBlToTr>
+                  </a:tcPr>
+                </a:tc>
+                <a:tc>
+                  <a:txBody>
+                    <a:bodyPr/>
+                    <a:lstStyle/>
+                    <a:p>
+                      <a:pPr algn="l" fontAlgn="b"/>
+                      <a:r>
+                        <a:rPr lang="en-US" sz="1900" b="1" u="none" strike="noStrike" dirty="0">
+                          <a:effectLst/>
+                        </a:rPr>
+                        <a:t>BMI</a:t>
+                      </a:r>
+                      <a:endParaRPr lang="en-US" sz="1900" b="1" i="0" u="none" strike="noStrike" dirty="0">
+                        <a:solidFill>
+                          <a:srgbClr val="000000"/>
+                        </a:solidFill>
+                        <a:effectLst/>
+                        <a:latin typeface="Calibri" panose="020F0502020204030204" pitchFamily="34" charset="0"/>
+                      </a:endParaRPr>
+                    </a:p>
+                  </a:txBody>
+                  <a:tcPr marL="16326" marR="16326" marT="16326" marB="0" anchor="b">
+                    <a:lnL>
+                      <a:noFill/>
+                    </a:lnL>
+                    <a:lnR>
+                      <a:noFill/>
+                    </a:lnR>
+                    <a:lnT w="25400" cmpd="sng">
+                      <a:noFill/>
+                    </a:lnT>
+                    <a:lnB>
+                      <a:noFill/>
+                    </a:lnB>
+                    <a:lnTlToBr w="12700" cmpd="sng">
+                      <a:noFill/>
+                      <a:prstDash val="solid"/>
+                    </a:lnTlToBr>
+                    <a:lnBlToTr w="12700" cmpd="sng">
+                      <a:noFill/>
+                      <a:prstDash val="solid"/>
+                    </a:lnBlToTr>
+                  </a:tcPr>
+                </a:tc>
+                <a:tc>
+                  <a:txBody>
+                    <a:bodyPr/>
+                    <a:lstStyle/>
+                    <a:p>
+                      <a:pPr algn="l" fontAlgn="b"/>
+                      <a:endParaRPr lang="en-US" sz="1900" b="0" i="0" u="none" strike="noStrike" dirty="0">
+                        <a:solidFill>
+                          <a:srgbClr val="000000"/>
+                        </a:solidFill>
+                        <a:effectLst/>
+                        <a:latin typeface="Calibri" panose="020F0502020204030204" pitchFamily="34" charset="0"/>
+                      </a:endParaRPr>
+                    </a:p>
+                  </a:txBody>
+                  <a:tcPr marL="16326" marR="16326" marT="16326" marB="0" anchor="b">
+                    <a:lnL>
+                      <a:noFill/>
+                    </a:lnL>
+                    <a:lnR>
+                      <a:noFill/>
+                    </a:lnR>
+                    <a:lnT w="25400" cmpd="sng">
+                      <a:noFill/>
+                    </a:lnT>
+                    <a:lnB>
+                      <a:noFill/>
+                    </a:lnB>
+                    <a:lnTlToBr w="12700" cmpd="sng">
+                      <a:noFill/>
+                      <a:prstDash val="solid"/>
+                    </a:lnTlToBr>
+                    <a:lnBlToTr w="12700" cmpd="sng">
+                      <a:noFill/>
+                      <a:prstDash val="solid"/>
+                    </a:lnBlToTr>
+                  </a:tcPr>
+                </a:tc>
+                <a:tc>
+                  <a:txBody>
+                    <a:bodyPr/>
+                    <a:lstStyle/>
+                    <a:p>
+                      <a:pPr algn="l" fontAlgn="b"/>
+                      <a:endParaRPr lang="en-US" sz="1900" b="0" i="0" u="none" strike="noStrike" dirty="0">
+                        <a:solidFill>
+                          <a:srgbClr val="000000"/>
+                        </a:solidFill>
+                        <a:effectLst/>
+                        <a:latin typeface="Calibri" panose="020F0502020204030204" pitchFamily="34" charset="0"/>
+                      </a:endParaRPr>
+                    </a:p>
+                  </a:txBody>
+                  <a:tcPr marL="16326" marR="16326" marT="16326" marB="0" anchor="b">
+                    <a:lnL>
+                      <a:noFill/>
+                    </a:lnL>
+                    <a:lnR>
+                      <a:noFill/>
+                    </a:lnR>
+                    <a:lnT w="25400" cmpd="sng">
+                      <a:noFill/>
+                    </a:lnT>
+                    <a:lnB>
+                      <a:noFill/>
+                    </a:lnB>
+                    <a:lnTlToBr w="12700" cmpd="sng">
+                      <a:noFill/>
+                      <a:prstDash val="solid"/>
+                    </a:lnTlToBr>
+                    <a:lnBlToTr w="12700" cmpd="sng">
+                      <a:noFill/>
+                      <a:prstDash val="solid"/>
+                    </a:lnBlToTr>
+                  </a:tcPr>
+                </a:tc>
+                <a:tc>
+                  <a:txBody>
+                    <a:bodyPr/>
+                    <a:lstStyle/>
+                    <a:p>
+                      <a:pPr algn="l" fontAlgn="b"/>
+                      <a:endParaRPr lang="en-US" sz="1900" b="0" i="0" u="none" strike="noStrike" dirty="0">
+                        <a:solidFill>
+                          <a:srgbClr val="000000"/>
+                        </a:solidFill>
+                        <a:effectLst/>
+                        <a:latin typeface="Calibri" panose="020F0502020204030204" pitchFamily="34" charset="0"/>
+                      </a:endParaRPr>
+                    </a:p>
+                  </a:txBody>
+                  <a:tcPr marL="16326" marR="16326" marT="16326" marB="0" anchor="b">
+                    <a:lnL>
+                      <a:noFill/>
+                    </a:lnL>
+                    <a:lnR>
+                      <a:noFill/>
+                    </a:lnR>
+                    <a:lnT w="25400" cmpd="sng">
+                      <a:noFill/>
+                    </a:lnT>
+                    <a:lnB>
+                      <a:noFill/>
+                    </a:lnB>
+                    <a:lnTlToBr w="12700" cmpd="sng">
+                      <a:noFill/>
+                      <a:prstDash val="solid"/>
+                    </a:lnTlToBr>
+                    <a:lnBlToTr w="12700" cmpd="sng">
+                      <a:noFill/>
+                      <a:prstDash val="solid"/>
+                    </a:lnBlToTr>
+                  </a:tcPr>
+                </a:tc>
+                <a:extLst>
+                  <a:ext uri="{0D108BD9-81ED-4DB2-BD59-A6C34878D82A}">
+                    <a16:rowId xmlns:a16="http://schemas.microsoft.com/office/drawing/2014/main" val="1815560364"/>
+                  </a:ext>
+                </a:extLst>
+              </a:tr>
+              <a:tr h="594936">
+                <a:tc>
+                  <a:txBody>
+                    <a:bodyPr/>
+                    <a:lstStyle/>
+                    <a:p>
+                      <a:pPr algn="l" fontAlgn="b"/>
+                      <a:endParaRPr lang="en-US" sz="1900" b="0" i="0" u="none" strike="noStrike" dirty="0">
+                        <a:solidFill>
+                          <a:srgbClr val="000000"/>
+                        </a:solidFill>
+                        <a:effectLst/>
+                        <a:latin typeface="Calibri" panose="020F0502020204030204" pitchFamily="34" charset="0"/>
+                      </a:endParaRPr>
+                    </a:p>
+                  </a:txBody>
+                  <a:tcPr marL="16326" marR="16326" marT="16326" marB="0" anchor="b">
+                    <a:lnT>
+                      <a:noFill/>
+                    </a:lnT>
+                    <a:lnB w="12700" cap="flat" cmpd="sng" algn="ctr">
+                      <a:solidFill>
+                        <a:schemeClr val="tx1"/>
+                      </a:solidFill>
+                      <a:prstDash val="solid"/>
+                      <a:round/>
+                      <a:headEnd type="none" w="med" len="med"/>
+                      <a:tailEnd type="none" w="med" len="med"/>
+                    </a:lnB>
+                  </a:tcPr>
+                </a:tc>
+                <a:tc>
+                  <a:txBody>
+                    <a:bodyPr/>
+                    <a:lstStyle/>
+                    <a:p>
+                      <a:pPr algn="l" fontAlgn="b"/>
+                      <a:r>
+                        <a:rPr lang="en-US" sz="1900" u="none" strike="noStrike" dirty="0">
+                          <a:effectLst/>
+                        </a:rPr>
+                        <a:t># sex het SNPs</a:t>
+                      </a:r>
+                      <a:endParaRPr lang="en-US" sz="1900" b="0" i="0" u="none" strike="noStrike" dirty="0">
+                        <a:solidFill>
+                          <a:srgbClr val="000000"/>
+                        </a:solidFill>
+                        <a:effectLst/>
+                        <a:latin typeface="Calibri" panose="020F0502020204030204" pitchFamily="34" charset="0"/>
+                      </a:endParaRPr>
+                    </a:p>
+                  </a:txBody>
+                  <a:tcPr marL="16326" marR="16326" marT="16326" marB="0" anchor="b">
+                    <a:lnT>
+                      <a:noFill/>
+                    </a:lnT>
+                    <a:lnB w="12700" cap="flat" cmpd="sng" algn="ctr">
+                      <a:solidFill>
+                        <a:schemeClr val="tx1"/>
+                      </a:solidFill>
+                      <a:prstDash val="solid"/>
+                      <a:round/>
+                      <a:headEnd type="none" w="med" len="med"/>
+                      <a:tailEnd type="none" w="med" len="med"/>
+                    </a:lnB>
+                  </a:tcPr>
+                </a:tc>
+                <a:tc>
+                  <a:txBody>
+                    <a:bodyPr/>
+                    <a:lstStyle/>
+                    <a:p>
+                      <a:pPr algn="l" fontAlgn="b"/>
+                      <a:r>
+                        <a:rPr lang="en-US" sz="1900" u="none" strike="noStrike" dirty="0">
+                          <a:effectLst/>
+                        </a:rPr>
+                        <a:t>% effect in one sex</a:t>
+                      </a:r>
+                      <a:endParaRPr lang="en-US" sz="1900" b="0" i="0" u="none" strike="noStrike" dirty="0">
+                        <a:solidFill>
+                          <a:srgbClr val="000000"/>
+                        </a:solidFill>
+                        <a:effectLst/>
+                        <a:latin typeface="Calibri" panose="020F0502020204030204" pitchFamily="34" charset="0"/>
+                      </a:endParaRPr>
+                    </a:p>
+                  </a:txBody>
+                  <a:tcPr marL="16326" marR="16326" marT="16326" marB="0" anchor="b">
+                    <a:lnT>
+                      <a:noFill/>
+                    </a:lnT>
+                    <a:lnB w="12700" cap="flat" cmpd="sng" algn="ctr">
+                      <a:solidFill>
+                        <a:schemeClr val="tx1"/>
+                      </a:solidFill>
+                      <a:prstDash val="solid"/>
+                      <a:round/>
+                      <a:headEnd type="none" w="med" len="med"/>
+                      <a:tailEnd type="none" w="med" len="med"/>
+                    </a:lnB>
+                  </a:tcPr>
+                </a:tc>
+                <a:tc>
+                  <a:txBody>
+                    <a:bodyPr/>
+                    <a:lstStyle/>
+                    <a:p>
+                      <a:pPr algn="l" fontAlgn="b"/>
+                      <a:r>
+                        <a:rPr lang="en-US" sz="1900" u="none" strike="noStrike" dirty="0">
+                          <a:effectLst/>
+                        </a:rPr>
+                        <a:t>% opposite direction</a:t>
+                      </a:r>
+                      <a:endParaRPr lang="en-US" sz="1900" b="0" i="0" u="none" strike="noStrike" dirty="0">
+                        <a:solidFill>
+                          <a:srgbClr val="000000"/>
+                        </a:solidFill>
+                        <a:effectLst/>
+                        <a:latin typeface="Calibri" panose="020F0502020204030204" pitchFamily="34" charset="0"/>
+                      </a:endParaRPr>
+                    </a:p>
+                  </a:txBody>
+                  <a:tcPr marL="16326" marR="16326" marT="16326" marB="0" anchor="b">
+                    <a:lnT>
+                      <a:noFill/>
+                    </a:lnT>
+                    <a:lnB w="12700" cap="flat" cmpd="sng" algn="ctr">
+                      <a:solidFill>
+                        <a:schemeClr val="tx1"/>
+                      </a:solidFill>
+                      <a:prstDash val="solid"/>
+                      <a:round/>
+                      <a:headEnd type="none" w="med" len="med"/>
+                      <a:tailEnd type="none" w="med" len="med"/>
+                    </a:lnB>
+                  </a:tcPr>
+                </a:tc>
+                <a:tc>
+                  <a:txBody>
+                    <a:bodyPr/>
+                    <a:lstStyle/>
+                    <a:p>
+                      <a:pPr algn="l" fontAlgn="b"/>
+                      <a:r>
+                        <a:rPr lang="en-US" sz="1900" u="none" strike="noStrike" dirty="0">
+                          <a:effectLst/>
+                        </a:rPr>
+                        <a:t>% same direction</a:t>
+                      </a:r>
+                      <a:endParaRPr lang="en-US" sz="1900" b="0" i="0" u="none" strike="noStrike" dirty="0">
+                        <a:solidFill>
+                          <a:srgbClr val="000000"/>
+                        </a:solidFill>
+                        <a:effectLst/>
+                        <a:latin typeface="Calibri" panose="020F0502020204030204" pitchFamily="34" charset="0"/>
+                      </a:endParaRPr>
+                    </a:p>
+                  </a:txBody>
+                  <a:tcPr marL="16326" marR="16326" marT="16326" marB="0" anchor="b">
+                    <a:lnT>
+                      <a:noFill/>
+                    </a:lnT>
+                    <a:lnB w="12700" cap="flat" cmpd="sng" algn="ctr">
+                      <a:solidFill>
+                        <a:schemeClr val="tx1"/>
+                      </a:solidFill>
+                      <a:prstDash val="solid"/>
+                      <a:round/>
+                      <a:headEnd type="none" w="med" len="med"/>
+                      <a:tailEnd type="none" w="med" len="med"/>
+                    </a:lnB>
+                  </a:tcPr>
+                </a:tc>
+                <a:extLst>
+                  <a:ext uri="{0D108BD9-81ED-4DB2-BD59-A6C34878D82A}">
+                    <a16:rowId xmlns:a16="http://schemas.microsoft.com/office/drawing/2014/main" val="4217566228"/>
+                  </a:ext>
+                </a:extLst>
+              </a:tr>
+              <a:tr h="326521">
+                <a:tc>
+                  <a:txBody>
+                    <a:bodyPr/>
+                    <a:lstStyle/>
+                    <a:p>
+                      <a:pPr algn="r" fontAlgn="b"/>
+                      <a:r>
+                        <a:rPr lang="en-US" sz="1900" b="0" i="0" u="none" strike="noStrike" dirty="0">
+                          <a:solidFill>
+                            <a:srgbClr val="000000"/>
+                          </a:solidFill>
+                          <a:effectLst/>
+                          <a:latin typeface="Calibri" panose="020F0502020204030204" pitchFamily="34" charset="0"/>
+                        </a:rPr>
+                        <a:t>Mean</a:t>
+                      </a:r>
+                    </a:p>
+                  </a:txBody>
+                  <a:tcPr marL="16326" marR="16326" marT="16326" marB="0" anchor="b">
+                    <a:lnR w="12700" cap="flat" cmpd="sng" algn="ctr">
+                      <a:solidFill>
+                        <a:schemeClr val="tx1"/>
+                      </a:solidFill>
+                      <a:prstDash val="solid"/>
+                      <a:round/>
+                      <a:headEnd type="none" w="med" len="med"/>
+                      <a:tailEnd type="none" w="med" len="med"/>
+                    </a:lnR>
+                    <a:lnT w="12700" cap="flat" cmpd="sng" algn="ctr">
+                      <a:solidFill>
+                        <a:schemeClr val="tx1"/>
+                      </a:solidFill>
+                      <a:prstDash val="solid"/>
+                      <a:round/>
+                      <a:headEnd type="none" w="med" len="med"/>
+                      <a:tailEnd type="none" w="med" len="med"/>
+                    </a:lnT>
+                  </a:tcPr>
+                </a:tc>
+                <a:tc>
+                  <a:txBody>
+                    <a:bodyPr/>
+                    <a:lstStyle/>
+                    <a:p>
+                      <a:pPr algn="r" fontAlgn="b"/>
+                      <a:r>
+                        <a:rPr lang="en-US" sz="1900" u="none" strike="noStrike" dirty="0">
+                          <a:effectLst/>
+                        </a:rPr>
+                        <a:t>268.9</a:t>
+                      </a:r>
+                      <a:endParaRPr lang="en-US" sz="1900" b="0" i="0" u="none" strike="noStrike" dirty="0">
+                        <a:solidFill>
+                          <a:srgbClr val="000000"/>
+                        </a:solidFill>
+                        <a:effectLst/>
+                        <a:latin typeface="Calibri" panose="020F0502020204030204" pitchFamily="34" charset="0"/>
+                      </a:endParaRPr>
+                    </a:p>
+                  </a:txBody>
+                  <a:tcPr marL="16326" marR="16326" marT="16326" marB="0" anchor="b">
+                    <a:lnL w="12700" cap="flat" cmpd="sng" algn="ctr">
+                      <a:solidFill>
+                        <a:schemeClr val="tx1"/>
+                      </a:solidFill>
+                      <a:prstDash val="solid"/>
+                      <a:round/>
+                      <a:headEnd type="none" w="med" len="med"/>
+                      <a:tailEnd type="none" w="med" len="med"/>
+                    </a:lnL>
+                    <a:lnT w="12700" cap="flat" cmpd="sng" algn="ctr">
+                      <a:solidFill>
+                        <a:schemeClr val="tx1"/>
+                      </a:solidFill>
+                      <a:prstDash val="solid"/>
+                      <a:round/>
+                      <a:headEnd type="none" w="med" len="med"/>
+                      <a:tailEnd type="none" w="med" len="med"/>
+                    </a:lnT>
+                  </a:tcPr>
+                </a:tc>
+                <a:tc>
+                  <a:txBody>
+                    <a:bodyPr/>
+                    <a:lstStyle/>
+                    <a:p>
+                      <a:pPr algn="r" fontAlgn="b"/>
+                      <a:r>
+                        <a:rPr lang="en-US" sz="1900" u="none" strike="noStrike">
+                          <a:effectLst/>
+                        </a:rPr>
+                        <a:t>40.6%</a:t>
+                      </a:r>
+                      <a:endParaRPr lang="en-US" sz="1900" b="0" i="0" u="none" strike="noStrike">
+                        <a:solidFill>
+                          <a:srgbClr val="000000"/>
+                        </a:solidFill>
+                        <a:effectLst/>
+                        <a:latin typeface="Calibri" panose="020F0502020204030204" pitchFamily="34" charset="0"/>
+                      </a:endParaRPr>
+                    </a:p>
+                  </a:txBody>
+                  <a:tcPr marL="16326" marR="16326" marT="16326" marB="0" anchor="b">
+                    <a:lnT w="12700" cap="flat" cmpd="sng" algn="ctr">
+                      <a:solidFill>
+                        <a:schemeClr val="tx1"/>
+                      </a:solidFill>
+                      <a:prstDash val="solid"/>
+                      <a:round/>
+                      <a:headEnd type="none" w="med" len="med"/>
+                      <a:tailEnd type="none" w="med" len="med"/>
+                    </a:lnT>
+                  </a:tcPr>
+                </a:tc>
+                <a:tc>
+                  <a:txBody>
+                    <a:bodyPr/>
+                    <a:lstStyle/>
+                    <a:p>
+                      <a:pPr algn="r" fontAlgn="b"/>
+                      <a:r>
+                        <a:rPr lang="en-US" sz="1900" u="none" strike="noStrike" dirty="0">
+                          <a:effectLst/>
+                        </a:rPr>
+                        <a:t>10.3%</a:t>
+                      </a:r>
+                      <a:endParaRPr lang="en-US" sz="1900" b="0" i="0" u="none" strike="noStrike" dirty="0">
+                        <a:solidFill>
+                          <a:srgbClr val="000000"/>
+                        </a:solidFill>
+                        <a:effectLst/>
+                        <a:latin typeface="Calibri" panose="020F0502020204030204" pitchFamily="34" charset="0"/>
+                      </a:endParaRPr>
+                    </a:p>
+                  </a:txBody>
+                  <a:tcPr marL="16326" marR="16326" marT="16326" marB="0" anchor="b">
+                    <a:lnT w="12700" cap="flat" cmpd="sng" algn="ctr">
+                      <a:solidFill>
+                        <a:schemeClr val="tx1"/>
+                      </a:solidFill>
+                      <a:prstDash val="solid"/>
+                      <a:round/>
+                      <a:headEnd type="none" w="med" len="med"/>
+                      <a:tailEnd type="none" w="med" len="med"/>
+                    </a:lnT>
+                  </a:tcPr>
+                </a:tc>
+                <a:tc>
+                  <a:txBody>
+                    <a:bodyPr/>
+                    <a:lstStyle/>
+                    <a:p>
+                      <a:pPr algn="r" fontAlgn="b"/>
+                      <a:r>
+                        <a:rPr lang="en-US" sz="1900" u="none" strike="noStrike" dirty="0">
+                          <a:effectLst/>
+                        </a:rPr>
+                        <a:t>49.1%</a:t>
+                      </a:r>
+                      <a:endParaRPr lang="en-US" sz="1900" b="0" i="0" u="none" strike="noStrike" dirty="0">
+                        <a:solidFill>
+                          <a:srgbClr val="000000"/>
+                        </a:solidFill>
+                        <a:effectLst/>
+                        <a:latin typeface="Calibri" panose="020F0502020204030204" pitchFamily="34" charset="0"/>
+                      </a:endParaRPr>
+                    </a:p>
+                  </a:txBody>
+                  <a:tcPr marL="16326" marR="16326" marT="16326" marB="0" anchor="b">
+                    <a:lnT w="12700" cap="flat" cmpd="sng" algn="ctr">
+                      <a:solidFill>
+                        <a:schemeClr val="tx1"/>
+                      </a:solidFill>
+                      <a:prstDash val="solid"/>
+                      <a:round/>
+                      <a:headEnd type="none" w="med" len="med"/>
+                      <a:tailEnd type="none" w="med" len="med"/>
+                    </a:lnT>
+                  </a:tcPr>
+                </a:tc>
+                <a:extLst>
+                  <a:ext uri="{0D108BD9-81ED-4DB2-BD59-A6C34878D82A}">
+                    <a16:rowId xmlns:a16="http://schemas.microsoft.com/office/drawing/2014/main" val="3237756091"/>
+                  </a:ext>
+                </a:extLst>
+              </a:tr>
+              <a:tr h="326521">
+                <a:tc>
+                  <a:txBody>
+                    <a:bodyPr/>
+                    <a:lstStyle/>
+                    <a:p>
+                      <a:pPr algn="r" fontAlgn="b"/>
+                      <a:r>
+                        <a:rPr lang="en-US" sz="1900" b="0" i="0" u="none" strike="noStrike" dirty="0">
+                          <a:solidFill>
+                            <a:srgbClr val="000000"/>
+                          </a:solidFill>
+                          <a:effectLst/>
+                          <a:latin typeface="Calibri" panose="020F0502020204030204" pitchFamily="34" charset="0"/>
+                        </a:rPr>
+                        <a:t>SE</a:t>
+                      </a:r>
+                    </a:p>
+                  </a:txBody>
+                  <a:tcPr marL="16326" marR="16326" marT="16326" marB="0" anchor="b">
+                    <a:lnR w="12700" cap="flat" cmpd="sng" algn="ctr">
+                      <a:solidFill>
+                        <a:schemeClr val="tx1"/>
+                      </a:solidFill>
+                      <a:prstDash val="solid"/>
+                      <a:round/>
+                      <a:headEnd type="none" w="med" len="med"/>
+                      <a:tailEnd type="none" w="med" len="med"/>
+                    </a:lnR>
+                    <a:lnB w="12700" cap="flat" cmpd="sng" algn="ctr">
+                      <a:noFill/>
+                      <a:prstDash val="solid"/>
+                      <a:round/>
+                      <a:headEnd type="none" w="med" len="med"/>
+                      <a:tailEnd type="none" w="med" len="med"/>
+                    </a:lnB>
+                  </a:tcPr>
+                </a:tc>
+                <a:tc>
+                  <a:txBody>
+                    <a:bodyPr/>
+                    <a:lstStyle/>
+                    <a:p>
+                      <a:pPr algn="r" fontAlgn="b"/>
+                      <a:r>
+                        <a:rPr lang="en-US" sz="1900" u="none" strike="noStrike" dirty="0">
+                          <a:effectLst/>
+                        </a:rPr>
+                        <a:t>2.99</a:t>
+                      </a:r>
+                      <a:endParaRPr lang="en-US" sz="1900" b="0" i="0" u="none" strike="noStrike" dirty="0">
+                        <a:solidFill>
+                          <a:srgbClr val="000000"/>
+                        </a:solidFill>
+                        <a:effectLst/>
+                        <a:latin typeface="Calibri" panose="020F0502020204030204" pitchFamily="34" charset="0"/>
+                      </a:endParaRPr>
+                    </a:p>
+                  </a:txBody>
+                  <a:tcPr marL="16326" marR="16326" marT="16326" marB="0" anchor="b">
+                    <a:lnL w="12700" cap="flat" cmpd="sng" algn="ctr">
+                      <a:solidFill>
+                        <a:schemeClr val="tx1"/>
+                      </a:solidFill>
+                      <a:prstDash val="solid"/>
+                      <a:round/>
+                      <a:headEnd type="none" w="med" len="med"/>
+                      <a:tailEnd type="none" w="med" len="med"/>
+                    </a:lnL>
+                    <a:lnB w="12700" cap="flat" cmpd="sng" algn="ctr">
+                      <a:noFill/>
+                      <a:prstDash val="solid"/>
+                      <a:round/>
+                      <a:headEnd type="none" w="med" len="med"/>
+                      <a:tailEnd type="none" w="med" len="med"/>
+                    </a:lnB>
+                  </a:tcPr>
+                </a:tc>
+                <a:tc>
+                  <a:txBody>
+                    <a:bodyPr/>
+                    <a:lstStyle/>
+                    <a:p>
+                      <a:pPr algn="r" fontAlgn="b"/>
+                      <a:r>
+                        <a:rPr lang="en-US" sz="1900" u="none" strike="noStrike" dirty="0">
+                          <a:effectLst/>
+                        </a:rPr>
+                        <a:t>1.2%</a:t>
+                      </a:r>
+                      <a:endParaRPr lang="en-US" sz="1900" b="0" i="0" u="none" strike="noStrike" dirty="0">
+                        <a:solidFill>
+                          <a:srgbClr val="000000"/>
+                        </a:solidFill>
+                        <a:effectLst/>
+                        <a:latin typeface="Calibri" panose="020F0502020204030204" pitchFamily="34" charset="0"/>
+                      </a:endParaRPr>
+                    </a:p>
+                  </a:txBody>
+                  <a:tcPr marL="16326" marR="16326" marT="16326" marB="0" anchor="b">
+                    <a:lnB w="12700" cap="flat" cmpd="sng" algn="ctr">
+                      <a:noFill/>
+                      <a:prstDash val="solid"/>
+                      <a:round/>
+                      <a:headEnd type="none" w="med" len="med"/>
+                      <a:tailEnd type="none" w="med" len="med"/>
+                    </a:lnB>
+                  </a:tcPr>
+                </a:tc>
+                <a:tc>
+                  <a:txBody>
+                    <a:bodyPr/>
+                    <a:lstStyle/>
+                    <a:p>
+                      <a:pPr algn="r" fontAlgn="b"/>
+                      <a:r>
+                        <a:rPr lang="en-US" sz="1900" u="none" strike="noStrike" dirty="0">
+                          <a:effectLst/>
+                        </a:rPr>
+                        <a:t>0.7%</a:t>
+                      </a:r>
+                      <a:endParaRPr lang="en-US" sz="1900" b="0" i="0" u="none" strike="noStrike" dirty="0">
+                        <a:solidFill>
+                          <a:srgbClr val="000000"/>
+                        </a:solidFill>
+                        <a:effectLst/>
+                        <a:latin typeface="Calibri" panose="020F0502020204030204" pitchFamily="34" charset="0"/>
+                      </a:endParaRPr>
+                    </a:p>
+                  </a:txBody>
+                  <a:tcPr marL="16326" marR="16326" marT="16326" marB="0" anchor="b">
+                    <a:lnB w="12700" cap="flat" cmpd="sng" algn="ctr">
+                      <a:noFill/>
+                      <a:prstDash val="solid"/>
+                      <a:round/>
+                      <a:headEnd type="none" w="med" len="med"/>
+                      <a:tailEnd type="none" w="med" len="med"/>
+                    </a:lnB>
+                  </a:tcPr>
+                </a:tc>
+                <a:tc>
+                  <a:txBody>
+                    <a:bodyPr/>
+                    <a:lstStyle/>
+                    <a:p>
+                      <a:pPr algn="r" fontAlgn="b"/>
+                      <a:r>
+                        <a:rPr lang="en-US" sz="1900" u="none" strike="noStrike" dirty="0">
+                          <a:effectLst/>
+                        </a:rPr>
+                        <a:t>1.1%</a:t>
+                      </a:r>
+                      <a:endParaRPr lang="en-US" sz="1900" b="0" i="0" u="none" strike="noStrike" dirty="0">
+                        <a:solidFill>
+                          <a:srgbClr val="000000"/>
+                        </a:solidFill>
+                        <a:effectLst/>
+                        <a:latin typeface="Calibri" panose="020F0502020204030204" pitchFamily="34" charset="0"/>
+                      </a:endParaRPr>
+                    </a:p>
+                  </a:txBody>
+                  <a:tcPr marL="16326" marR="16326" marT="16326" marB="0" anchor="b">
+                    <a:lnB w="12700" cap="flat" cmpd="sng" algn="ctr">
+                      <a:noFill/>
+                      <a:prstDash val="solid"/>
+                      <a:round/>
+                      <a:headEnd type="none" w="med" len="med"/>
+                      <a:tailEnd type="none" w="med" len="med"/>
+                    </a:lnB>
+                  </a:tcPr>
+                </a:tc>
+                <a:extLst>
+                  <a:ext uri="{0D108BD9-81ED-4DB2-BD59-A6C34878D82A}">
+                    <a16:rowId xmlns:a16="http://schemas.microsoft.com/office/drawing/2014/main" val="3793770838"/>
+                  </a:ext>
+                </a:extLst>
+              </a:tr>
+            </a:tbl>
+          </a:graphicData>
+        </a:graphic>
+      </p:graphicFrame>
+    </p:spTree>
+    <p:extLst>
+      <p:ext uri="{BB962C8B-B14F-4D97-AF65-F5344CB8AC3E}">
+        <p14:creationId xmlns:p14="http://schemas.microsoft.com/office/powerpoint/2010/main" val="2381897950"/>
       </p:ext>
     </p:extLst>
   </p:cSld>

</xml_diff>